<commit_message>
Updated .ppt with screenshots
</commit_message>
<xml_diff>
--- a/Resources/Presentation 2 Powerpoint_FINAL.pptx
+++ b/Resources/Presentation 2 Powerpoint_FINAL.pptx
@@ -10,12 +10,16 @@
     <p:sldId id="265" r:id="rId4"/>
     <p:sldId id="272" r:id="rId5"/>
     <p:sldId id="271" r:id="rId6"/>
-    <p:sldId id="266" r:id="rId7"/>
-    <p:sldId id="269" r:id="rId8"/>
-    <p:sldId id="268" r:id="rId9"/>
-    <p:sldId id="270" r:id="rId10"/>
-    <p:sldId id="264" r:id="rId11"/>
-    <p:sldId id="267" r:id="rId12"/>
+    <p:sldId id="273" r:id="rId7"/>
+    <p:sldId id="274" r:id="rId8"/>
+    <p:sldId id="267" r:id="rId9"/>
+    <p:sldId id="266" r:id="rId10"/>
+    <p:sldId id="269" r:id="rId11"/>
+    <p:sldId id="268" r:id="rId12"/>
+    <p:sldId id="264" r:id="rId13"/>
+    <p:sldId id="275" r:id="rId14"/>
+    <p:sldId id="276" r:id="rId15"/>
+    <p:sldId id="270" r:id="rId16"/>
   </p:sldIdLst>
   <p:sldSz cx="12192000" cy="6858000"/>
   <p:notesSz cx="6858000" cy="9144000"/>
@@ -3469,754 +3473,6 @@
       </p:grpSpPr>
       <p:sp>
         <p:nvSpPr>
-          <p:cNvPr id="2" name="Title 1">
-            <a:extLst>
-              <a:ext uri="{FF2B5EF4-FFF2-40B4-BE49-F238E27FC236}">
-                <a16:creationId xmlns:a16="http://schemas.microsoft.com/office/drawing/2014/main" id="{98F263C8-E2FF-1C43-B6B6-3D12456E0495}"/>
-              </a:ext>
-            </a:extLst>
-          </p:cNvPr>
-          <p:cNvSpPr>
-            <a:spLocks noGrp="1"/>
-          </p:cNvSpPr>
-          <p:nvPr>
-            <p:ph type="title"/>
-          </p:nvPr>
-        </p:nvSpPr>
-        <p:spPr>
-          <a:xfrm>
-            <a:off x="838200" y="2766218"/>
-            <a:ext cx="10515600" cy="1325563"/>
-          </a:xfrm>
-        </p:spPr>
-        <p:txBody>
-          <a:bodyPr/>
-          <a:lstStyle/>
-          <a:p>
-            <a:pPr algn="ctr"/>
-            <a:r>
-              <a:rPr lang="en-US" dirty="0"/>
-              <a:t>Appendix</a:t>
-            </a:r>
-          </a:p>
-        </p:txBody>
-      </p:sp>
-    </p:spTree>
-    <p:extLst>
-      <p:ext uri="{BB962C8B-B14F-4D97-AF65-F5344CB8AC3E}">
-        <p14:creationId xmlns:p14="http://schemas.microsoft.com/office/powerpoint/2010/main" val="2396937465"/>
-      </p:ext>
-    </p:extLst>
-  </p:cSld>
-  <p:clrMapOvr>
-    <a:masterClrMapping/>
-  </p:clrMapOvr>
-</p:sld>
-</file>
-
-<file path=ppt/slides/slide11.xml><?xml version="1.0" encoding="utf-8"?>
-<p:sld xmlns:a="http://schemas.openxmlformats.org/drawingml/2006/main" xmlns:r="http://schemas.openxmlformats.org/officeDocument/2006/relationships" xmlns:p="http://schemas.openxmlformats.org/presentationml/2006/main">
-  <p:cSld>
-    <p:spTree>
-      <p:nvGrpSpPr>
-        <p:cNvPr id="1" name=""/>
-        <p:cNvGrpSpPr/>
-        <p:nvPr/>
-      </p:nvGrpSpPr>
-      <p:grpSpPr>
-        <a:xfrm>
-          <a:off x="0" y="0"/>
-          <a:ext cx="0" cy="0"/>
-          <a:chOff x="0" y="0"/>
-          <a:chExt cx="0" cy="0"/>
-        </a:xfrm>
-      </p:grpSpPr>
-    </p:spTree>
-    <p:extLst>
-      <p:ext uri="{BB962C8B-B14F-4D97-AF65-F5344CB8AC3E}">
-        <p14:creationId xmlns:p14="http://schemas.microsoft.com/office/powerpoint/2010/main" val="2327277018"/>
-      </p:ext>
-    </p:extLst>
-  </p:cSld>
-  <p:clrMapOvr>
-    <a:masterClrMapping/>
-  </p:clrMapOvr>
-</p:sld>
-</file>
-
-<file path=ppt/slides/slide2.xml><?xml version="1.0" encoding="utf-8"?>
-<p:sld xmlns:a="http://schemas.openxmlformats.org/drawingml/2006/main" xmlns:r="http://schemas.openxmlformats.org/officeDocument/2006/relationships" xmlns:p="http://schemas.openxmlformats.org/presentationml/2006/main">
-  <p:cSld>
-    <p:spTree>
-      <p:nvGrpSpPr>
-        <p:cNvPr id="1" name=""/>
-        <p:cNvGrpSpPr/>
-        <p:nvPr/>
-      </p:nvGrpSpPr>
-      <p:grpSpPr>
-        <a:xfrm>
-          <a:off x="0" y="0"/>
-          <a:ext cx="0" cy="0"/>
-          <a:chOff x="0" y="0"/>
-          <a:chExt cx="0" cy="0"/>
-        </a:xfrm>
-      </p:grpSpPr>
-      <p:sp>
-        <p:nvSpPr>
-          <p:cNvPr id="2" name="Title 1">
-            <a:extLst>
-              <a:ext uri="{FF2B5EF4-FFF2-40B4-BE49-F238E27FC236}">
-                <a16:creationId xmlns:a16="http://schemas.microsoft.com/office/drawing/2014/main" id="{98F263C8-E2FF-1C43-B6B6-3D12456E0495}"/>
-              </a:ext>
-            </a:extLst>
-          </p:cNvPr>
-          <p:cNvSpPr>
-            <a:spLocks noGrp="1"/>
-          </p:cNvSpPr>
-          <p:nvPr>
-            <p:ph type="title"/>
-          </p:nvPr>
-        </p:nvSpPr>
-        <p:spPr/>
-        <p:txBody>
-          <a:bodyPr/>
-          <a:lstStyle/>
-          <a:p>
-            <a:r>
-              <a:rPr lang="en-US" dirty="0"/>
-              <a:t>Extract Process</a:t>
-            </a:r>
-          </a:p>
-        </p:txBody>
-      </p:sp>
-      <p:sp>
-        <p:nvSpPr>
-          <p:cNvPr id="3" name="Content Placeholder 2">
-            <a:extLst>
-              <a:ext uri="{FF2B5EF4-FFF2-40B4-BE49-F238E27FC236}">
-                <a16:creationId xmlns:a16="http://schemas.microsoft.com/office/drawing/2014/main" id="{F692B38E-C3FA-D444-A1AA-A5A3B9461394}"/>
-              </a:ext>
-            </a:extLst>
-          </p:cNvPr>
-          <p:cNvSpPr>
-            <a:spLocks noGrp="1"/>
-          </p:cNvSpPr>
-          <p:nvPr>
-            <p:ph idx="1"/>
-          </p:nvPr>
-        </p:nvSpPr>
-        <p:spPr/>
-        <p:txBody>
-          <a:bodyPr>
-            <a:normAutofit/>
-          </a:bodyPr>
-          <a:lstStyle/>
-          <a:p>
-            <a:pPr marL="0" indent="0">
-              <a:buNone/>
-            </a:pPr>
-            <a:r>
-              <a:rPr lang="en-US" dirty="0"/>
-              <a:t>Read data</a:t>
-            </a:r>
-          </a:p>
-          <a:p>
-            <a:r>
-              <a:rPr lang="en-US" sz="2200" dirty="0"/>
-              <a:t>We used several data sources to processes to cleanse and prep files in the following formats:</a:t>
-            </a:r>
-          </a:p>
-          <a:p>
-            <a:r>
-              <a:rPr lang="en-US" sz="2200" dirty="0"/>
-              <a:t>CSV files / JSON files / Spreadsheets </a:t>
-            </a:r>
-          </a:p>
-          <a:p>
-            <a:endParaRPr lang="en-US" sz="2200" dirty="0"/>
-          </a:p>
-          <a:p>
-            <a:pPr marL="0" indent="0">
-              <a:buNone/>
-            </a:pPr>
-            <a:r>
-              <a:rPr lang="en-US" sz="2200" dirty="0"/>
-              <a:t>Data Sources </a:t>
-            </a:r>
-          </a:p>
-          <a:p>
-            <a:r>
-              <a:rPr lang="en-US" sz="2200" dirty="0">
-                <a:hlinkClick r:id="rId2"/>
-              </a:rPr>
-              <a:t>www.geonames.org</a:t>
-            </a:r>
-            <a:r>
-              <a:rPr lang="en-US" sz="2200" dirty="0"/>
-              <a:t> (.txt converted to csv) and (JSON to csv)</a:t>
-            </a:r>
-          </a:p>
-          <a:p>
-            <a:r>
-              <a:rPr lang="en-US" sz="2200" dirty="0">
-                <a:hlinkClick r:id="rId3"/>
-              </a:rPr>
-              <a:t>www.cdc.gov.gov/zika/reporting/index.html</a:t>
-            </a:r>
-            <a:r>
-              <a:rPr lang="en-US" sz="2200" dirty="0"/>
-              <a:t> (.</a:t>
-            </a:r>
-            <a:r>
-              <a:rPr lang="en-US" sz="2200" dirty="0" err="1"/>
-              <a:t>xls</a:t>
-            </a:r>
-            <a:r>
-              <a:rPr lang="en-US" sz="2200" dirty="0"/>
-              <a:t> converted to csv)</a:t>
-            </a:r>
-          </a:p>
-          <a:p>
-            <a:r>
-              <a:rPr lang="en-US" sz="2200" dirty="0">
-                <a:hlinkClick r:id="rId4"/>
-              </a:rPr>
-              <a:t>www.census.gov/topics/health/birth-defects </a:t>
-            </a:r>
-            <a:r>
-              <a:rPr lang="en-US" sz="2200" dirty="0"/>
-              <a:t> (csv file)</a:t>
-            </a:r>
-          </a:p>
-          <a:p>
-            <a:endParaRPr lang="en-US" sz="2200" dirty="0"/>
-          </a:p>
-          <a:p>
-            <a:endParaRPr lang="en-US" sz="2200" dirty="0"/>
-          </a:p>
-          <a:p>
-            <a:pPr marL="0" indent="0">
-              <a:buNone/>
-            </a:pPr>
-            <a:endParaRPr lang="en-US" sz="2200" dirty="0"/>
-          </a:p>
-          <a:p>
-            <a:endParaRPr lang="en-US" sz="2200" dirty="0"/>
-          </a:p>
-          <a:p>
-            <a:endParaRPr lang="en-US" dirty="0"/>
-          </a:p>
-        </p:txBody>
-      </p:sp>
-    </p:spTree>
-    <p:extLst>
-      <p:ext uri="{BB962C8B-B14F-4D97-AF65-F5344CB8AC3E}">
-        <p14:creationId xmlns:p14="http://schemas.microsoft.com/office/powerpoint/2010/main" val="4198240260"/>
-      </p:ext>
-    </p:extLst>
-  </p:cSld>
-  <p:clrMapOvr>
-    <a:masterClrMapping/>
-  </p:clrMapOvr>
-</p:sld>
-</file>
-
-<file path=ppt/slides/slide3.xml><?xml version="1.0" encoding="utf-8"?>
-<p:sld xmlns:a="http://schemas.openxmlformats.org/drawingml/2006/main" xmlns:r="http://schemas.openxmlformats.org/officeDocument/2006/relationships" xmlns:p="http://schemas.openxmlformats.org/presentationml/2006/main">
-  <p:cSld>
-    <p:spTree>
-      <p:nvGrpSpPr>
-        <p:cNvPr id="1" name=""/>
-        <p:cNvGrpSpPr/>
-        <p:nvPr/>
-      </p:nvGrpSpPr>
-      <p:grpSpPr>
-        <a:xfrm>
-          <a:off x="0" y="0"/>
-          <a:ext cx="0" cy="0"/>
-          <a:chOff x="0" y="0"/>
-          <a:chExt cx="0" cy="0"/>
-        </a:xfrm>
-      </p:grpSpPr>
-      <p:sp>
-        <p:nvSpPr>
-          <p:cNvPr id="2" name="Title 1">
-            <a:extLst>
-              <a:ext uri="{FF2B5EF4-FFF2-40B4-BE49-F238E27FC236}">
-                <a16:creationId xmlns:a16="http://schemas.microsoft.com/office/drawing/2014/main" id="{98F263C8-E2FF-1C43-B6B6-3D12456E0495}"/>
-              </a:ext>
-            </a:extLst>
-          </p:cNvPr>
-          <p:cNvSpPr>
-            <a:spLocks noGrp="1"/>
-          </p:cNvSpPr>
-          <p:nvPr>
-            <p:ph type="title"/>
-          </p:nvPr>
-        </p:nvSpPr>
-        <p:spPr/>
-        <p:txBody>
-          <a:bodyPr/>
-          <a:lstStyle/>
-          <a:p>
-            <a:r>
-              <a:rPr lang="en-US" dirty="0"/>
-              <a:t>Transformation Process</a:t>
-            </a:r>
-          </a:p>
-        </p:txBody>
-      </p:sp>
-      <p:sp>
-        <p:nvSpPr>
-          <p:cNvPr id="3" name="Content Placeholder 2">
-            <a:extLst>
-              <a:ext uri="{FF2B5EF4-FFF2-40B4-BE49-F238E27FC236}">
-                <a16:creationId xmlns:a16="http://schemas.microsoft.com/office/drawing/2014/main" id="{F692B38E-C3FA-D444-A1AA-A5A3B9461394}"/>
-              </a:ext>
-            </a:extLst>
-          </p:cNvPr>
-          <p:cNvSpPr>
-            <a:spLocks noGrp="1"/>
-          </p:cNvSpPr>
-          <p:nvPr>
-            <p:ph idx="1"/>
-          </p:nvPr>
-        </p:nvSpPr>
-        <p:spPr/>
-        <p:txBody>
-          <a:bodyPr>
-            <a:normAutofit/>
-          </a:bodyPr>
-          <a:lstStyle/>
-          <a:p>
-            <a:r>
-              <a:rPr lang="en-US" dirty="0"/>
-              <a:t>Data cleaning</a:t>
-            </a:r>
-          </a:p>
-          <a:p>
-            <a:pPr lvl="1"/>
-            <a:r>
-              <a:rPr lang="en-US" dirty="0"/>
-              <a:t>Manipulated data and used (states as primary id)</a:t>
-            </a:r>
-          </a:p>
-          <a:p>
-            <a:endParaRPr lang="en-US" dirty="0"/>
-          </a:p>
-          <a:p>
-            <a:r>
-              <a:rPr lang="en-US" dirty="0"/>
-              <a:t>Joining</a:t>
-            </a:r>
-          </a:p>
-          <a:p>
-            <a:pPr lvl="1"/>
-            <a:r>
-              <a:rPr lang="en-US" dirty="0"/>
-              <a:t>Joined multiple data sources into one repository</a:t>
-            </a:r>
-          </a:p>
-          <a:p>
-            <a:endParaRPr lang="en-US" dirty="0"/>
-          </a:p>
-          <a:p>
-            <a:endParaRPr lang="en-US" dirty="0"/>
-          </a:p>
-          <a:p>
-            <a:endParaRPr lang="en-US" dirty="0"/>
-          </a:p>
-        </p:txBody>
-      </p:sp>
-    </p:spTree>
-    <p:extLst>
-      <p:ext uri="{BB962C8B-B14F-4D97-AF65-F5344CB8AC3E}">
-        <p14:creationId xmlns:p14="http://schemas.microsoft.com/office/powerpoint/2010/main" val="2908985784"/>
-      </p:ext>
-    </p:extLst>
-  </p:cSld>
-  <p:clrMapOvr>
-    <a:masterClrMapping/>
-  </p:clrMapOvr>
-</p:sld>
-</file>
-
-<file path=ppt/slides/slide4.xml><?xml version="1.0" encoding="utf-8"?>
-<p:sld xmlns:a="http://schemas.openxmlformats.org/drawingml/2006/main" xmlns:r="http://schemas.openxmlformats.org/officeDocument/2006/relationships" xmlns:p="http://schemas.openxmlformats.org/presentationml/2006/main">
-  <p:cSld>
-    <p:spTree>
-      <p:nvGrpSpPr>
-        <p:cNvPr id="1" name=""/>
-        <p:cNvGrpSpPr/>
-        <p:nvPr/>
-      </p:nvGrpSpPr>
-      <p:grpSpPr>
-        <a:xfrm>
-          <a:off x="0" y="0"/>
-          <a:ext cx="0" cy="0"/>
-          <a:chOff x="0" y="0"/>
-          <a:chExt cx="0" cy="0"/>
-        </a:xfrm>
-      </p:grpSpPr>
-      <p:sp>
-        <p:nvSpPr>
-          <p:cNvPr id="2" name="Title 1">
-            <a:extLst>
-              <a:ext uri="{FF2B5EF4-FFF2-40B4-BE49-F238E27FC236}">
-                <a16:creationId xmlns:a16="http://schemas.microsoft.com/office/drawing/2014/main" id="{98F263C8-E2FF-1C43-B6B6-3D12456E0495}"/>
-              </a:ext>
-            </a:extLst>
-          </p:cNvPr>
-          <p:cNvSpPr>
-            <a:spLocks noGrp="1"/>
-          </p:cNvSpPr>
-          <p:nvPr>
-            <p:ph type="title"/>
-          </p:nvPr>
-        </p:nvSpPr>
-        <p:spPr/>
-        <p:txBody>
-          <a:bodyPr/>
-          <a:lstStyle/>
-          <a:p>
-            <a:r>
-              <a:rPr lang="en-US" dirty="0"/>
-              <a:t>Transformation Process Continued</a:t>
-            </a:r>
-          </a:p>
-        </p:txBody>
-      </p:sp>
-      <p:sp>
-        <p:nvSpPr>
-          <p:cNvPr id="3" name="Content Placeholder 2">
-            <a:extLst>
-              <a:ext uri="{FF2B5EF4-FFF2-40B4-BE49-F238E27FC236}">
-                <a16:creationId xmlns:a16="http://schemas.microsoft.com/office/drawing/2014/main" id="{F692B38E-C3FA-D444-A1AA-A5A3B9461394}"/>
-              </a:ext>
-            </a:extLst>
-          </p:cNvPr>
-          <p:cNvSpPr>
-            <a:spLocks noGrp="1"/>
-          </p:cNvSpPr>
-          <p:nvPr>
-            <p:ph idx="1"/>
-          </p:nvPr>
-        </p:nvSpPr>
-        <p:spPr/>
-        <p:txBody>
-          <a:bodyPr>
-            <a:normAutofit/>
-          </a:bodyPr>
-          <a:lstStyle/>
-          <a:p>
-            <a:r>
-              <a:rPr lang="en-US" dirty="0"/>
-              <a:t>Filtering</a:t>
-            </a:r>
-          </a:p>
-          <a:p>
-            <a:pPr lvl="1"/>
-            <a:r>
-              <a:rPr lang="en-US" dirty="0"/>
-              <a:t>The filtering process consisted of</a:t>
-            </a:r>
-          </a:p>
-          <a:p>
-            <a:pPr lvl="1"/>
-            <a:endParaRPr lang="en-US" dirty="0"/>
-          </a:p>
-          <a:p>
-            <a:pPr marL="0" indent="0">
-              <a:buNone/>
-            </a:pPr>
-            <a:endParaRPr lang="en-US" dirty="0"/>
-          </a:p>
-          <a:p>
-            <a:r>
-              <a:rPr lang="en-US" dirty="0"/>
-              <a:t>Aggregating</a:t>
-            </a:r>
-          </a:p>
-          <a:p>
-            <a:pPr lvl="1"/>
-            <a:r>
-              <a:rPr lang="en-US" dirty="0"/>
-              <a:t>The aggregating process consisted of</a:t>
-            </a:r>
-          </a:p>
-          <a:p>
-            <a:endParaRPr lang="en-US" dirty="0"/>
-          </a:p>
-          <a:p>
-            <a:endParaRPr lang="en-US" dirty="0"/>
-          </a:p>
-          <a:p>
-            <a:endParaRPr lang="en-US" dirty="0"/>
-          </a:p>
-        </p:txBody>
-      </p:sp>
-    </p:spTree>
-    <p:extLst>
-      <p:ext uri="{BB962C8B-B14F-4D97-AF65-F5344CB8AC3E}">
-        <p14:creationId xmlns:p14="http://schemas.microsoft.com/office/powerpoint/2010/main" val="761823061"/>
-      </p:ext>
-    </p:extLst>
-  </p:cSld>
-  <p:clrMapOvr>
-    <a:masterClrMapping/>
-  </p:clrMapOvr>
-</p:sld>
-</file>
-
-<file path=ppt/slides/slide5.xml><?xml version="1.0" encoding="utf-8"?>
-<p:sld xmlns:a="http://schemas.openxmlformats.org/drawingml/2006/main" xmlns:r="http://schemas.openxmlformats.org/officeDocument/2006/relationships" xmlns:p="http://schemas.openxmlformats.org/presentationml/2006/main">
-  <p:cSld>
-    <p:spTree>
-      <p:nvGrpSpPr>
-        <p:cNvPr id="1" name=""/>
-        <p:cNvGrpSpPr/>
-        <p:nvPr/>
-      </p:nvGrpSpPr>
-      <p:grpSpPr>
-        <a:xfrm>
-          <a:off x="0" y="0"/>
-          <a:ext cx="0" cy="0"/>
-          <a:chOff x="0" y="0"/>
-          <a:chExt cx="0" cy="0"/>
-        </a:xfrm>
-      </p:grpSpPr>
-      <p:sp>
-        <p:nvSpPr>
-          <p:cNvPr id="2" name="Title 1">
-            <a:extLst>
-              <a:ext uri="{FF2B5EF4-FFF2-40B4-BE49-F238E27FC236}">
-                <a16:creationId xmlns:a16="http://schemas.microsoft.com/office/drawing/2014/main" id="{98F263C8-E2FF-1C43-B6B6-3D12456E0495}"/>
-              </a:ext>
-            </a:extLst>
-          </p:cNvPr>
-          <p:cNvSpPr>
-            <a:spLocks noGrp="1"/>
-          </p:cNvSpPr>
-          <p:nvPr>
-            <p:ph type="title"/>
-          </p:nvPr>
-        </p:nvSpPr>
-        <p:spPr/>
-        <p:txBody>
-          <a:bodyPr/>
-          <a:lstStyle/>
-          <a:p>
-            <a:r>
-              <a:rPr lang="en-US" dirty="0"/>
-              <a:t>Transformation Process Continued</a:t>
-            </a:r>
-          </a:p>
-        </p:txBody>
-      </p:sp>
-      <p:sp>
-        <p:nvSpPr>
-          <p:cNvPr id="3" name="Content Placeholder 2">
-            <a:extLst>
-              <a:ext uri="{FF2B5EF4-FFF2-40B4-BE49-F238E27FC236}">
-                <a16:creationId xmlns:a16="http://schemas.microsoft.com/office/drawing/2014/main" id="{F692B38E-C3FA-D444-A1AA-A5A3B9461394}"/>
-              </a:ext>
-            </a:extLst>
-          </p:cNvPr>
-          <p:cNvSpPr>
-            <a:spLocks noGrp="1"/>
-          </p:cNvSpPr>
-          <p:nvPr>
-            <p:ph idx="1"/>
-          </p:nvPr>
-        </p:nvSpPr>
-        <p:spPr/>
-        <p:txBody>
-          <a:bodyPr>
-            <a:normAutofit/>
-          </a:bodyPr>
-          <a:lstStyle/>
-          <a:p>
-            <a:r>
-              <a:rPr lang="en-US" dirty="0"/>
-              <a:t>Selection</a:t>
-            </a:r>
-          </a:p>
-          <a:p>
-            <a:pPr lvl="1"/>
-            <a:r>
-              <a:rPr lang="en-US" dirty="0"/>
-              <a:t>The selection process consisted of</a:t>
-            </a:r>
-          </a:p>
-          <a:p>
-            <a:endParaRPr lang="en-US" dirty="0"/>
-          </a:p>
-          <a:p>
-            <a:endParaRPr lang="en-US" dirty="0"/>
-          </a:p>
-          <a:p>
-            <a:r>
-              <a:rPr lang="en-US" dirty="0"/>
-              <a:t>Summarization</a:t>
-            </a:r>
-          </a:p>
-          <a:p>
-            <a:pPr lvl="1"/>
-            <a:r>
-              <a:rPr lang="en-US" dirty="0"/>
-              <a:t>The summarization process consisted of</a:t>
-            </a:r>
-          </a:p>
-          <a:p>
-            <a:endParaRPr lang="en-US" dirty="0"/>
-          </a:p>
-          <a:p>
-            <a:endParaRPr lang="en-US" dirty="0"/>
-          </a:p>
-          <a:p>
-            <a:endParaRPr lang="en-US" dirty="0"/>
-          </a:p>
-        </p:txBody>
-      </p:sp>
-    </p:spTree>
-    <p:extLst>
-      <p:ext uri="{BB962C8B-B14F-4D97-AF65-F5344CB8AC3E}">
-        <p14:creationId xmlns:p14="http://schemas.microsoft.com/office/powerpoint/2010/main" val="1595102223"/>
-      </p:ext>
-    </p:extLst>
-  </p:cSld>
-  <p:clrMapOvr>
-    <a:masterClrMapping/>
-  </p:clrMapOvr>
-</p:sld>
-</file>
-
-<file path=ppt/slides/slide6.xml><?xml version="1.0" encoding="utf-8"?>
-<p:sld xmlns:a="http://schemas.openxmlformats.org/drawingml/2006/main" xmlns:r="http://schemas.openxmlformats.org/officeDocument/2006/relationships" xmlns:p="http://schemas.openxmlformats.org/presentationml/2006/main">
-  <p:cSld>
-    <p:spTree>
-      <p:nvGrpSpPr>
-        <p:cNvPr id="1" name=""/>
-        <p:cNvGrpSpPr/>
-        <p:nvPr/>
-      </p:nvGrpSpPr>
-      <p:grpSpPr>
-        <a:xfrm>
-          <a:off x="0" y="0"/>
-          <a:ext cx="0" cy="0"/>
-          <a:chOff x="0" y="0"/>
-          <a:chExt cx="0" cy="0"/>
-        </a:xfrm>
-      </p:grpSpPr>
-      <p:sp>
-        <p:nvSpPr>
-          <p:cNvPr id="2" name="Title 1">
-            <a:extLst>
-              <a:ext uri="{FF2B5EF4-FFF2-40B4-BE49-F238E27FC236}">
-                <a16:creationId xmlns:a16="http://schemas.microsoft.com/office/drawing/2014/main" id="{98F263C8-E2FF-1C43-B6B6-3D12456E0495}"/>
-              </a:ext>
-            </a:extLst>
-          </p:cNvPr>
-          <p:cNvSpPr>
-            <a:spLocks noGrp="1"/>
-          </p:cNvSpPr>
-          <p:nvPr>
-            <p:ph type="title"/>
-          </p:nvPr>
-        </p:nvSpPr>
-        <p:spPr/>
-        <p:txBody>
-          <a:bodyPr/>
-          <a:lstStyle/>
-          <a:p>
-            <a:r>
-              <a:rPr lang="en-US" dirty="0"/>
-              <a:t>Load Process</a:t>
-            </a:r>
-          </a:p>
-        </p:txBody>
-      </p:sp>
-      <p:sp>
-        <p:nvSpPr>
-          <p:cNvPr id="3" name="Content Placeholder 2">
-            <a:extLst>
-              <a:ext uri="{FF2B5EF4-FFF2-40B4-BE49-F238E27FC236}">
-                <a16:creationId xmlns:a16="http://schemas.microsoft.com/office/drawing/2014/main" id="{F692B38E-C3FA-D444-A1AA-A5A3B9461394}"/>
-              </a:ext>
-            </a:extLst>
-          </p:cNvPr>
-          <p:cNvSpPr>
-            <a:spLocks noGrp="1"/>
-          </p:cNvSpPr>
-          <p:nvPr>
-            <p:ph idx="1"/>
-          </p:nvPr>
-        </p:nvSpPr>
-        <p:spPr/>
-        <p:txBody>
-          <a:bodyPr/>
-          <a:lstStyle/>
-          <a:p>
-            <a:pPr marL="0" indent="0">
-              <a:buNone/>
-            </a:pPr>
-            <a:r>
-              <a:rPr lang="en-US" dirty="0"/>
-              <a:t>Load process</a:t>
-            </a:r>
-          </a:p>
-          <a:p>
-            <a:r>
-              <a:rPr lang="en-US" dirty="0"/>
-              <a:t>The final load process consolidated multiple data sources into one central database</a:t>
-            </a:r>
-          </a:p>
-          <a:p>
-            <a:endParaRPr lang="en-US" dirty="0"/>
-          </a:p>
-          <a:p>
-            <a:r>
-              <a:rPr lang="en-US" dirty="0"/>
-              <a:t>This database will be accessed by power users such as analysts, data scientists and executives to run various reports via multiple data management tools</a:t>
-            </a:r>
-          </a:p>
-          <a:p>
-            <a:endParaRPr lang="en-US" dirty="0"/>
-          </a:p>
-        </p:txBody>
-      </p:sp>
-    </p:spTree>
-    <p:extLst>
-      <p:ext uri="{BB962C8B-B14F-4D97-AF65-F5344CB8AC3E}">
-        <p14:creationId xmlns:p14="http://schemas.microsoft.com/office/powerpoint/2010/main" val="696670445"/>
-      </p:ext>
-    </p:extLst>
-  </p:cSld>
-  <p:clrMapOvr>
-    <a:masterClrMapping/>
-  </p:clrMapOvr>
-</p:sld>
-</file>
-
-<file path=ppt/slides/slide7.xml><?xml version="1.0" encoding="utf-8"?>
-<p:sld xmlns:a="http://schemas.openxmlformats.org/drawingml/2006/main" xmlns:r="http://schemas.openxmlformats.org/officeDocument/2006/relationships" xmlns:p="http://schemas.openxmlformats.org/presentationml/2006/main">
-  <p:cSld>
-    <p:spTree>
-      <p:nvGrpSpPr>
-        <p:cNvPr id="1" name=""/>
-        <p:cNvGrpSpPr/>
-        <p:nvPr/>
-      </p:nvGrpSpPr>
-      <p:grpSpPr>
-        <a:xfrm>
-          <a:off x="0" y="0"/>
-          <a:ext cx="0" cy="0"/>
-          <a:chOff x="0" y="0"/>
-          <a:chExt cx="0" cy="0"/>
-        </a:xfrm>
-      </p:grpSpPr>
-      <p:sp>
-        <p:nvSpPr>
           <p:cNvPr id="4" name="Title 1">
             <a:extLst>
               <a:ext uri="{FF2B5EF4-FFF2-40B4-BE49-F238E27FC236}">
@@ -4289,12 +3545,12 @@
           <a:effectLst/>
           <a:extLst>
             <a:ext uri="{909E8E84-426E-40dd-AFC4-6F175D3DCCD1}">
-              <a14:hiddenFill xmlns:a14="http://schemas.microsoft.com/office/drawing/2010/main" xmlns="">
+              <a14:hiddenFill xmlns="" xmlns:a14="http://schemas.microsoft.com/office/drawing/2010/main">
                 <a:noFill/>
               </a14:hiddenFill>
             </a:ext>
             <a:ext uri="{AF507438-7753-43e0-B8FC-AC1667EBCBE1}">
-              <a14:hiddenEffects xmlns:a14="http://schemas.microsoft.com/office/drawing/2010/main" xmlns="">
+              <a14:hiddenEffects xmlns="" xmlns:a14="http://schemas.microsoft.com/office/drawing/2010/main">
                 <a:effectLst>
                   <a:outerShdw blurRad="63500" dist="38099" dir="2700000" algn="ctr" rotWithShape="0">
                     <a:schemeClr val="bg2">
@@ -4355,12 +3611,12 @@
           <a:effectLst/>
           <a:extLst>
             <a:ext uri="{909E8E84-426E-40dd-AFC4-6F175D3DCCD1}">
-              <a14:hiddenFill xmlns:a14="http://schemas.microsoft.com/office/drawing/2010/main" xmlns="">
+              <a14:hiddenFill xmlns="" xmlns:a14="http://schemas.microsoft.com/office/drawing/2010/main">
                 <a:noFill/>
               </a14:hiddenFill>
             </a:ext>
             <a:ext uri="{AF507438-7753-43e0-B8FC-AC1667EBCBE1}">
-              <a14:hiddenEffects xmlns:a14="http://schemas.microsoft.com/office/drawing/2010/main" xmlns="">
+              <a14:hiddenEffects xmlns="" xmlns:a14="http://schemas.microsoft.com/office/drawing/2010/main">
                 <a:effectLst>
                   <a:outerShdw blurRad="63500" dist="38099" dir="2700000" algn="ctr" rotWithShape="0">
                     <a:schemeClr val="bg2">
@@ -4421,12 +3677,12 @@
           <a:effectLst/>
           <a:extLst>
             <a:ext uri="{909E8E84-426E-40dd-AFC4-6F175D3DCCD1}">
-              <a14:hiddenFill xmlns:a14="http://schemas.microsoft.com/office/drawing/2010/main" xmlns="">
+              <a14:hiddenFill xmlns="" xmlns:a14="http://schemas.microsoft.com/office/drawing/2010/main">
                 <a:noFill/>
               </a14:hiddenFill>
             </a:ext>
             <a:ext uri="{AF507438-7753-43e0-B8FC-AC1667EBCBE1}">
-              <a14:hiddenEffects xmlns:a14="http://schemas.microsoft.com/office/drawing/2010/main" xmlns="">
+              <a14:hiddenEffects xmlns="" xmlns:a14="http://schemas.microsoft.com/office/drawing/2010/main">
                 <a:effectLst>
                   <a:outerShdw blurRad="63500" dist="38099" dir="2700000" algn="ctr" rotWithShape="0">
                     <a:schemeClr val="bg2">
@@ -4487,12 +3743,12 @@
           <a:effectLst/>
           <a:extLst>
             <a:ext uri="{909E8E84-426E-40dd-AFC4-6F175D3DCCD1}">
-              <a14:hiddenFill xmlns:a14="http://schemas.microsoft.com/office/drawing/2010/main" xmlns="">
+              <a14:hiddenFill xmlns="" xmlns:a14="http://schemas.microsoft.com/office/drawing/2010/main">
                 <a:noFill/>
               </a14:hiddenFill>
             </a:ext>
             <a:ext uri="{AF507438-7753-43e0-B8FC-AC1667EBCBE1}">
-              <a14:hiddenEffects xmlns:a14="http://schemas.microsoft.com/office/drawing/2010/main" xmlns="">
+              <a14:hiddenEffects xmlns="" xmlns:a14="http://schemas.microsoft.com/office/drawing/2010/main">
                 <a:effectLst>
                   <a:outerShdw blurRad="63500" dist="38099" dir="2700000" algn="ctr" rotWithShape="0">
                     <a:schemeClr val="bg2">
@@ -4547,14 +3803,14 @@
           <a:effectLst/>
           <a:extLst>
             <a:ext uri="{909E8E84-426E-40dd-AFC4-6F175D3DCCD1}">
-              <a14:hiddenFill xmlns:a14="http://schemas.microsoft.com/office/drawing/2010/main" xmlns="">
+              <a14:hiddenFill xmlns="" xmlns:a14="http://schemas.microsoft.com/office/drawing/2010/main">
                 <a:solidFill>
                   <a:schemeClr val="accent1"/>
                 </a:solidFill>
               </a14:hiddenFill>
             </a:ext>
             <a:ext uri="{91240B29-F687-4f45-9708-019B960494DF}">
-              <a14:hiddenLine xmlns:a14="http://schemas.microsoft.com/office/drawing/2010/main" xmlns="" w="9525">
+              <a14:hiddenLine xmlns="" xmlns:a14="http://schemas.microsoft.com/office/drawing/2010/main" w="9525">
                 <a:solidFill>
                   <a:schemeClr val="tx1"/>
                 </a:solidFill>
@@ -4564,7 +3820,7 @@
               </a14:hiddenLine>
             </a:ext>
             <a:ext uri="{AF507438-7753-43e0-B8FC-AC1667EBCBE1}">
-              <a14:hiddenEffects xmlns:a14="http://schemas.microsoft.com/office/drawing/2010/main" xmlns="">
+              <a14:hiddenEffects xmlns="" xmlns:a14="http://schemas.microsoft.com/office/drawing/2010/main">
                 <a:effectLst>
                   <a:outerShdw blurRad="63500" dist="38099" dir="2700000" algn="ctr" rotWithShape="0">
                     <a:schemeClr val="bg2">
@@ -4635,14 +3891,14 @@
           <a:effectLst/>
           <a:extLst>
             <a:ext uri="{909E8E84-426E-40dd-AFC4-6F175D3DCCD1}">
-              <a14:hiddenFill xmlns:a14="http://schemas.microsoft.com/office/drawing/2010/main" xmlns="">
+              <a14:hiddenFill xmlns="" xmlns:a14="http://schemas.microsoft.com/office/drawing/2010/main">
                 <a:solidFill>
                   <a:schemeClr val="accent1"/>
                 </a:solidFill>
               </a14:hiddenFill>
             </a:ext>
             <a:ext uri="{91240B29-F687-4f45-9708-019B960494DF}">
-              <a14:hiddenLine xmlns:a14="http://schemas.microsoft.com/office/drawing/2010/main" xmlns="" w="9525">
+              <a14:hiddenLine xmlns="" xmlns:a14="http://schemas.microsoft.com/office/drawing/2010/main" w="9525">
                 <a:solidFill>
                   <a:schemeClr val="tx1"/>
                 </a:solidFill>
@@ -4652,7 +3908,7 @@
               </a14:hiddenLine>
             </a:ext>
             <a:ext uri="{AF507438-7753-43e0-B8FC-AC1667EBCBE1}">
-              <a14:hiddenEffects xmlns:a14="http://schemas.microsoft.com/office/drawing/2010/main" xmlns="">
+              <a14:hiddenEffects xmlns="" xmlns:a14="http://schemas.microsoft.com/office/drawing/2010/main">
                 <a:effectLst>
                   <a:outerShdw blurRad="63500" dist="38099" dir="2700000" algn="ctr" rotWithShape="0">
                     <a:schemeClr val="bg2">
@@ -4731,14 +3987,14 @@
           <a:effectLst/>
           <a:extLst>
             <a:ext uri="{909E8E84-426E-40dd-AFC4-6F175D3DCCD1}">
-              <a14:hiddenFill xmlns:a14="http://schemas.microsoft.com/office/drawing/2010/main" xmlns="">
+              <a14:hiddenFill xmlns="" xmlns:a14="http://schemas.microsoft.com/office/drawing/2010/main">
                 <a:solidFill>
                   <a:schemeClr val="accent1"/>
                 </a:solidFill>
               </a14:hiddenFill>
             </a:ext>
             <a:ext uri="{91240B29-F687-4f45-9708-019B960494DF}">
-              <a14:hiddenLine xmlns:a14="http://schemas.microsoft.com/office/drawing/2010/main" xmlns="" w="9525">
+              <a14:hiddenLine xmlns="" xmlns:a14="http://schemas.microsoft.com/office/drawing/2010/main" w="9525">
                 <a:solidFill>
                   <a:schemeClr val="tx1"/>
                 </a:solidFill>
@@ -4748,7 +4004,7 @@
               </a14:hiddenLine>
             </a:ext>
             <a:ext uri="{AF507438-7753-43e0-B8FC-AC1667EBCBE1}">
-              <a14:hiddenEffects xmlns:a14="http://schemas.microsoft.com/office/drawing/2010/main" xmlns="">
+              <a14:hiddenEffects xmlns="" xmlns:a14="http://schemas.microsoft.com/office/drawing/2010/main">
                 <a:effectLst>
                   <a:outerShdw blurRad="63500" dist="38099" dir="2700000" algn="ctr" rotWithShape="0">
                     <a:schemeClr val="bg2">
@@ -4808,14 +4064,14 @@
           <a:effectLst/>
           <a:extLst>
             <a:ext uri="{909E8E84-426E-40dd-AFC4-6F175D3DCCD1}">
-              <a14:hiddenFill xmlns:a14="http://schemas.microsoft.com/office/drawing/2010/main" xmlns="">
+              <a14:hiddenFill xmlns="" xmlns:a14="http://schemas.microsoft.com/office/drawing/2010/main">
                 <a:solidFill>
                   <a:schemeClr val="accent1"/>
                 </a:solidFill>
               </a14:hiddenFill>
             </a:ext>
             <a:ext uri="{91240B29-F687-4f45-9708-019B960494DF}">
-              <a14:hiddenLine xmlns:a14="http://schemas.microsoft.com/office/drawing/2010/main" xmlns="" w="9525">
+              <a14:hiddenLine xmlns="" xmlns:a14="http://schemas.microsoft.com/office/drawing/2010/main" w="9525">
                 <a:solidFill>
                   <a:schemeClr val="tx1"/>
                 </a:solidFill>
@@ -4825,7 +4081,7 @@
               </a14:hiddenLine>
             </a:ext>
             <a:ext uri="{AF507438-7753-43e0-B8FC-AC1667EBCBE1}">
-              <a14:hiddenEffects xmlns:a14="http://schemas.microsoft.com/office/drawing/2010/main" xmlns="">
+              <a14:hiddenEffects xmlns="" xmlns:a14="http://schemas.microsoft.com/office/drawing/2010/main">
                 <a:effectLst>
                   <a:outerShdw blurRad="63500" dist="38099" dir="2700000" algn="ctr" rotWithShape="0">
                     <a:schemeClr val="bg2">
@@ -4905,7 +4161,7 @@
           </a:effectLst>
           <a:extLst>
             <a:ext uri="{91240B29-F687-4f45-9708-019B960494DF}">
-              <a14:hiddenLine xmlns:a14="http://schemas.microsoft.com/office/drawing/2010/main" xmlns="" w="9525">
+              <a14:hiddenLine xmlns="" xmlns:a14="http://schemas.microsoft.com/office/drawing/2010/main" w="9525">
                 <a:solidFill>
                   <a:srgbClr val="000000"/>
                 </a:solidFill>
@@ -4994,14 +4250,14 @@
             </a:ln>
             <a:extLst>
               <a:ext uri="{909E8E84-426E-40dd-AFC4-6F175D3DCCD1}">
-                <a14:hiddenFill xmlns:a14="http://schemas.microsoft.com/office/drawing/2010/main" xmlns="">
+                <a14:hiddenFill xmlns="" xmlns:a14="http://schemas.microsoft.com/office/drawing/2010/main">
                   <a:solidFill>
                     <a:srgbClr val="FFFFFF"/>
                   </a:solidFill>
                 </a14:hiddenFill>
               </a:ext>
               <a:ext uri="{91240B29-F687-4f45-9708-019B960494DF}">
-                <a14:hiddenLine xmlns:a14="http://schemas.microsoft.com/office/drawing/2010/main" xmlns="" w="9525">
+                <a14:hiddenLine xmlns="" xmlns:a14="http://schemas.microsoft.com/office/drawing/2010/main" w="9525">
                   <a:solidFill>
                     <a:srgbClr val="000000"/>
                   </a:solidFill>
@@ -5041,14 +4297,14 @@
             </a:ln>
             <a:extLst>
               <a:ext uri="{909E8E84-426E-40dd-AFC4-6F175D3DCCD1}">
-                <a14:hiddenFill xmlns:a14="http://schemas.microsoft.com/office/drawing/2010/main" xmlns="">
+                <a14:hiddenFill xmlns="" xmlns:a14="http://schemas.microsoft.com/office/drawing/2010/main">
                   <a:solidFill>
                     <a:srgbClr val="FFFFFF"/>
                   </a:solidFill>
                 </a14:hiddenFill>
               </a:ext>
               <a:ext uri="{91240B29-F687-4f45-9708-019B960494DF}">
-                <a14:hiddenLine xmlns:a14="http://schemas.microsoft.com/office/drawing/2010/main" xmlns="" w="9525">
+                <a14:hiddenLine xmlns="" xmlns:a14="http://schemas.microsoft.com/office/drawing/2010/main" w="9525">
                   <a:solidFill>
                     <a:srgbClr val="000000"/>
                   </a:solidFill>
@@ -5240,14 +4496,14 @@
             </a:ln>
             <a:extLst>
               <a:ext uri="{909E8E84-426E-40dd-AFC4-6F175D3DCCD1}">
-                <a14:hiddenFill xmlns:a14="http://schemas.microsoft.com/office/drawing/2010/main" xmlns="">
+                <a14:hiddenFill xmlns="" xmlns:a14="http://schemas.microsoft.com/office/drawing/2010/main">
                   <a:solidFill>
                     <a:srgbClr val="FFFFFF"/>
                   </a:solidFill>
                 </a14:hiddenFill>
               </a:ext>
               <a:ext uri="{91240B29-F687-4f45-9708-019B960494DF}">
-                <a14:hiddenLine xmlns:a14="http://schemas.microsoft.com/office/drawing/2010/main" xmlns="" w="9525">
+                <a14:hiddenLine xmlns="" xmlns:a14="http://schemas.microsoft.com/office/drawing/2010/main" w="9525">
                   <a:solidFill>
                     <a:srgbClr val="000000"/>
                   </a:solidFill>
@@ -5287,14 +4543,14 @@
             </a:ln>
             <a:extLst>
               <a:ext uri="{909E8E84-426E-40dd-AFC4-6F175D3DCCD1}">
-                <a14:hiddenFill xmlns:a14="http://schemas.microsoft.com/office/drawing/2010/main" xmlns="">
+                <a14:hiddenFill xmlns="" xmlns:a14="http://schemas.microsoft.com/office/drawing/2010/main">
                   <a:solidFill>
                     <a:srgbClr val="FFFFFF"/>
                   </a:solidFill>
                 </a14:hiddenFill>
               </a:ext>
               <a:ext uri="{91240B29-F687-4f45-9708-019B960494DF}">
-                <a14:hiddenLine xmlns:a14="http://schemas.microsoft.com/office/drawing/2010/main" xmlns="" w="9525">
+                <a14:hiddenLine xmlns="" xmlns:a14="http://schemas.microsoft.com/office/drawing/2010/main" w="9525">
                   <a:solidFill>
                     <a:srgbClr val="000000"/>
                   </a:solidFill>
@@ -5486,14 +4742,14 @@
             </a:ln>
             <a:extLst>
               <a:ext uri="{909E8E84-426E-40dd-AFC4-6F175D3DCCD1}">
-                <a14:hiddenFill xmlns:a14="http://schemas.microsoft.com/office/drawing/2010/main" xmlns="">
+                <a14:hiddenFill xmlns="" xmlns:a14="http://schemas.microsoft.com/office/drawing/2010/main">
                   <a:solidFill>
                     <a:srgbClr val="FFFFFF"/>
                   </a:solidFill>
                 </a14:hiddenFill>
               </a:ext>
               <a:ext uri="{91240B29-F687-4f45-9708-019B960494DF}">
-                <a14:hiddenLine xmlns:a14="http://schemas.microsoft.com/office/drawing/2010/main" xmlns="" w="9525">
+                <a14:hiddenLine xmlns="" xmlns:a14="http://schemas.microsoft.com/office/drawing/2010/main" w="9525">
                   <a:solidFill>
                     <a:srgbClr val="000000"/>
                   </a:solidFill>
@@ -5533,14 +4789,14 @@
             </a:ln>
             <a:extLst>
               <a:ext uri="{909E8E84-426E-40dd-AFC4-6F175D3DCCD1}">
-                <a14:hiddenFill xmlns:a14="http://schemas.microsoft.com/office/drawing/2010/main" xmlns="">
+                <a14:hiddenFill xmlns="" xmlns:a14="http://schemas.microsoft.com/office/drawing/2010/main">
                   <a:solidFill>
                     <a:srgbClr val="FFFFFF"/>
                   </a:solidFill>
                 </a14:hiddenFill>
               </a:ext>
               <a:ext uri="{91240B29-F687-4f45-9708-019B960494DF}">
-                <a14:hiddenLine xmlns:a14="http://schemas.microsoft.com/office/drawing/2010/main" xmlns="" w="9525">
+                <a14:hiddenLine xmlns="" xmlns:a14="http://schemas.microsoft.com/office/drawing/2010/main" w="9525">
                   <a:solidFill>
                     <a:srgbClr val="000000"/>
                   </a:solidFill>
@@ -5732,14 +4988,14 @@
             </a:ln>
             <a:extLst>
               <a:ext uri="{909E8E84-426E-40dd-AFC4-6F175D3DCCD1}">
-                <a14:hiddenFill xmlns:a14="http://schemas.microsoft.com/office/drawing/2010/main" xmlns="">
+                <a14:hiddenFill xmlns="" xmlns:a14="http://schemas.microsoft.com/office/drawing/2010/main">
                   <a:solidFill>
                     <a:srgbClr val="FFFFFF"/>
                   </a:solidFill>
                 </a14:hiddenFill>
               </a:ext>
               <a:ext uri="{91240B29-F687-4f45-9708-019B960494DF}">
-                <a14:hiddenLine xmlns:a14="http://schemas.microsoft.com/office/drawing/2010/main" xmlns="" w="9525">
+                <a14:hiddenLine xmlns="" xmlns:a14="http://schemas.microsoft.com/office/drawing/2010/main" w="9525">
                   <a:solidFill>
                     <a:srgbClr val="000000"/>
                   </a:solidFill>
@@ -5779,14 +5035,14 @@
             </a:ln>
             <a:extLst>
               <a:ext uri="{909E8E84-426E-40dd-AFC4-6F175D3DCCD1}">
-                <a14:hiddenFill xmlns:a14="http://schemas.microsoft.com/office/drawing/2010/main" xmlns="">
+                <a14:hiddenFill xmlns="" xmlns:a14="http://schemas.microsoft.com/office/drawing/2010/main">
                   <a:solidFill>
                     <a:srgbClr val="FFFFFF"/>
                   </a:solidFill>
                 </a14:hiddenFill>
               </a:ext>
               <a:ext uri="{91240B29-F687-4f45-9708-019B960494DF}">
-                <a14:hiddenLine xmlns:a14="http://schemas.microsoft.com/office/drawing/2010/main" xmlns="" w="9525">
+                <a14:hiddenLine xmlns="" xmlns:a14="http://schemas.microsoft.com/office/drawing/2010/main" w="9525">
                   <a:solidFill>
                     <a:srgbClr val="000000"/>
                   </a:solidFill>
@@ -6002,7 +5258,7 @@
           </a:effectLst>
           <a:extLst>
             <a:ext uri="{91240B29-F687-4f45-9708-019B960494DF}">
-              <a14:hiddenLine xmlns:a14="http://schemas.microsoft.com/office/drawing/2010/main" xmlns="" w="9525">
+              <a14:hiddenLine xmlns="" xmlns:a14="http://schemas.microsoft.com/office/drawing/2010/main" w="9525">
                 <a:solidFill>
                   <a:srgbClr val="000000"/>
                 </a:solidFill>
@@ -6168,7 +5424,7 @@
           </a:effectLst>
           <a:extLst>
             <a:ext uri="{91240B29-F687-4f45-9708-019B960494DF}">
-              <a14:hiddenLine xmlns:a14="http://schemas.microsoft.com/office/drawing/2010/main" xmlns="" w="9525">
+              <a14:hiddenLine xmlns="" xmlns:a14="http://schemas.microsoft.com/office/drawing/2010/main" w="9525">
                 <a:solidFill>
                   <a:srgbClr val="000000"/>
                 </a:solidFill>
@@ -6231,7 +5487,7 @@
           </a:effectLst>
           <a:extLst>
             <a:ext uri="{91240B29-F687-4f45-9708-019B960494DF}">
-              <a14:hiddenLine xmlns:a14="http://schemas.microsoft.com/office/drawing/2010/main" xmlns="" w="9525">
+              <a14:hiddenLine xmlns="" xmlns:a14="http://schemas.microsoft.com/office/drawing/2010/main" w="9525">
                 <a:solidFill>
                   <a:srgbClr val="000000"/>
                 </a:solidFill>
@@ -6294,7 +5550,7 @@
           </a:effectLst>
           <a:extLst>
             <a:ext uri="{91240B29-F687-4f45-9708-019B960494DF}">
-              <a14:hiddenLine xmlns:a14="http://schemas.microsoft.com/office/drawing/2010/main" xmlns="" w="9525">
+              <a14:hiddenLine xmlns="" xmlns:a14="http://schemas.microsoft.com/office/drawing/2010/main" w="9525">
                 <a:solidFill>
                   <a:srgbClr val="000000"/>
                 </a:solidFill>
@@ -6918,7 +6174,7 @@
           </a:effectLst>
           <a:extLst>
             <a:ext uri="{91240B29-F687-4f45-9708-019B960494DF}">
-              <a14:hiddenLine xmlns:a14="http://schemas.microsoft.com/office/drawing/2010/main" xmlns="" w="9525">
+              <a14:hiddenLine xmlns="" xmlns:a14="http://schemas.microsoft.com/office/drawing/2010/main" w="9525">
                 <a:solidFill>
                   <a:srgbClr val="000000"/>
                 </a:solidFill>
@@ -6998,7 +6254,7 @@
           </a:effectLst>
           <a:extLst>
             <a:ext uri="{91240B29-F687-4f45-9708-019B960494DF}">
-              <a14:hiddenLine xmlns:a14="http://schemas.microsoft.com/office/drawing/2010/main" xmlns="" w="9525">
+              <a14:hiddenLine xmlns="" xmlns:a14="http://schemas.microsoft.com/office/drawing/2010/main" w="9525">
                 <a:solidFill>
                   <a:srgbClr val="000000"/>
                 </a:solidFill>
@@ -7074,7 +6330,7 @@
           </a:effectLst>
           <a:extLst>
             <a:ext uri="{91240B29-F687-4f45-9708-019B960494DF}">
-              <a14:hiddenLine xmlns:a14="http://schemas.microsoft.com/office/drawing/2010/main" xmlns="" w="9525">
+              <a14:hiddenLine xmlns="" xmlns:a14="http://schemas.microsoft.com/office/drawing/2010/main" w="9525">
                 <a:solidFill>
                   <a:srgbClr val="000000"/>
                 </a:solidFill>
@@ -7137,14 +6393,14 @@
           </a:ln>
           <a:extLst>
             <a:ext uri="{909E8E84-426E-40dd-AFC4-6F175D3DCCD1}">
-              <a14:hiddenFill xmlns:a14="http://schemas.microsoft.com/office/drawing/2010/main" xmlns="">
+              <a14:hiddenFill xmlns="" xmlns:a14="http://schemas.microsoft.com/office/drawing/2010/main">
                 <a:solidFill>
                   <a:srgbClr val="FFFFFF"/>
                 </a:solidFill>
               </a14:hiddenFill>
             </a:ext>
             <a:ext uri="{91240B29-F687-4f45-9708-019B960494DF}">
-              <a14:hiddenLine xmlns:a14="http://schemas.microsoft.com/office/drawing/2010/main" xmlns="" w="9525">
+              <a14:hiddenLine xmlns="" xmlns:a14="http://schemas.microsoft.com/office/drawing/2010/main" w="9525">
                 <a:solidFill>
                   <a:srgbClr val="000000"/>
                 </a:solidFill>
@@ -7343,14 +6599,14 @@
           </a:ln>
           <a:extLst>
             <a:ext uri="{909E8E84-426E-40dd-AFC4-6F175D3DCCD1}">
-              <a14:hiddenFill xmlns:a14="http://schemas.microsoft.com/office/drawing/2010/main" xmlns="">
+              <a14:hiddenFill xmlns="" xmlns:a14="http://schemas.microsoft.com/office/drawing/2010/main">
                 <a:solidFill>
                   <a:srgbClr val="FFFFFF"/>
                 </a:solidFill>
               </a14:hiddenFill>
             </a:ext>
             <a:ext uri="{91240B29-F687-4f45-9708-019B960494DF}">
-              <a14:hiddenLine xmlns:a14="http://schemas.microsoft.com/office/drawing/2010/main" xmlns="" w="9525">
+              <a14:hiddenLine xmlns="" xmlns:a14="http://schemas.microsoft.com/office/drawing/2010/main" w="9525">
                 <a:solidFill>
                   <a:srgbClr val="000000"/>
                 </a:solidFill>
@@ -7399,7 +6655,7 @@
           </a:effectLst>
           <a:extLst>
             <a:ext uri="{91240B29-F687-4f45-9708-019B960494DF}">
-              <a14:hiddenLine xmlns:a14="http://schemas.microsoft.com/office/drawing/2010/main" xmlns="" w="9525">
+              <a14:hiddenLine xmlns="" xmlns:a14="http://schemas.microsoft.com/office/drawing/2010/main" w="9525">
                 <a:solidFill>
                   <a:srgbClr val="000000"/>
                 </a:solidFill>
@@ -7529,7 +6785,7 @@
           </a:effectLst>
           <a:extLst>
             <a:ext uri="{91240B29-F687-4f45-9708-019B960494DF}">
-              <a14:hiddenLine xmlns:a14="http://schemas.microsoft.com/office/drawing/2010/main" xmlns="" w="9525">
+              <a14:hiddenLine xmlns="" xmlns:a14="http://schemas.microsoft.com/office/drawing/2010/main" w="9525">
                 <a:solidFill>
                   <a:srgbClr val="000000"/>
                 </a:solidFill>
@@ -7618,7 +6874,7 @@
           <a:effectLst/>
           <a:extLst>
             <a:ext uri="{AF507438-7753-43e0-B8FC-AC1667EBCBE1}">
-              <a14:hiddenEffects xmlns:a14="http://schemas.microsoft.com/office/drawing/2010/main" xmlns="">
+              <a14:hiddenEffects xmlns="" xmlns:a14="http://schemas.microsoft.com/office/drawing/2010/main">
                 <a:effectLst>
                   <a:outerShdw blurRad="63500" dist="38099" dir="2700000" algn="ctr" rotWithShape="0">
                     <a:schemeClr val="bg2">
@@ -7768,14 +7024,14 @@
           <a:effectLst/>
           <a:extLst>
             <a:ext uri="{909E8E84-426E-40dd-AFC4-6F175D3DCCD1}">
-              <a14:hiddenFill xmlns:a14="http://schemas.microsoft.com/office/drawing/2010/main" xmlns="">
+              <a14:hiddenFill xmlns="" xmlns:a14="http://schemas.microsoft.com/office/drawing/2010/main">
                 <a:solidFill>
                   <a:schemeClr val="accent1"/>
                 </a:solidFill>
               </a14:hiddenFill>
             </a:ext>
             <a:ext uri="{91240B29-F687-4f45-9708-019B960494DF}">
-              <a14:hiddenLine xmlns:a14="http://schemas.microsoft.com/office/drawing/2010/main" xmlns="" w="9525">
+              <a14:hiddenLine xmlns="" xmlns:a14="http://schemas.microsoft.com/office/drawing/2010/main" w="9525">
                 <a:solidFill>
                   <a:schemeClr val="tx1"/>
                 </a:solidFill>
@@ -7785,7 +7041,7 @@
               </a14:hiddenLine>
             </a:ext>
             <a:ext uri="{AF507438-7753-43e0-B8FC-AC1667EBCBE1}">
-              <a14:hiddenEffects xmlns:a14="http://schemas.microsoft.com/office/drawing/2010/main" xmlns="">
+              <a14:hiddenEffects xmlns="" xmlns:a14="http://schemas.microsoft.com/office/drawing/2010/main">
                 <a:effectLst>
                   <a:outerShdw blurRad="63500" dist="38099" dir="2700000" algn="ctr" rotWithShape="0">
                     <a:schemeClr val="bg2">
@@ -8975,14 +8231,14 @@
           </a:ln>
           <a:extLst>
             <a:ext uri="{909E8E84-426E-40dd-AFC4-6F175D3DCCD1}">
-              <a14:hiddenFill xmlns="" xmlns:a14="http://schemas.microsoft.com/office/drawing/2010/main">
+              <a14:hiddenFill xmlns:a14="http://schemas.microsoft.com/office/drawing/2010/main" xmlns="">
                 <a:solidFill>
                   <a:srgbClr val="FFFFFF"/>
                 </a:solidFill>
               </a14:hiddenFill>
             </a:ext>
             <a:ext uri="{91240B29-F687-4f45-9708-019B960494DF}">
-              <a14:hiddenLine xmlns="" xmlns:a14="http://schemas.microsoft.com/office/drawing/2010/main" w="9525">
+              <a14:hiddenLine xmlns:a14="http://schemas.microsoft.com/office/drawing/2010/main" xmlns="" w="9525">
                 <a:solidFill>
                   <a:srgbClr val="000000"/>
                 </a:solidFill>
@@ -9022,14 +8278,14 @@
           </a:ln>
           <a:extLst>
             <a:ext uri="{909E8E84-426E-40dd-AFC4-6F175D3DCCD1}">
-              <a14:hiddenFill xmlns:a14="http://schemas.microsoft.com/office/drawing/2010/main" xmlns="">
+              <a14:hiddenFill xmlns="" xmlns:a14="http://schemas.microsoft.com/office/drawing/2010/main">
                 <a:solidFill>
                   <a:srgbClr val="FFFFFF"/>
                 </a:solidFill>
               </a14:hiddenFill>
             </a:ext>
             <a:ext uri="{91240B29-F687-4f45-9708-019B960494DF}">
-              <a14:hiddenLine xmlns:a14="http://schemas.microsoft.com/office/drawing/2010/main" xmlns="" w="9525">
+              <a14:hiddenLine xmlns="" xmlns:a14="http://schemas.microsoft.com/office/drawing/2010/main" w="9525">
                 <a:solidFill>
                   <a:srgbClr val="000000"/>
                 </a:solidFill>
@@ -9200,7 +8456,7 @@
 </p:sld>
 </file>
 
-<file path=ppt/slides/slide8.xml><?xml version="1.0" encoding="utf-8"?>
+<file path=ppt/slides/slide11.xml><?xml version="1.0" encoding="utf-8"?>
 <p:sld xmlns:a="http://schemas.openxmlformats.org/drawingml/2006/main" xmlns:r="http://schemas.openxmlformats.org/officeDocument/2006/relationships" xmlns:p="http://schemas.openxmlformats.org/presentationml/2006/main">
   <p:cSld>
     <p:spTree>
@@ -9333,7 +8589,131 @@
 </p:sld>
 </file>
 
-<file path=ppt/slides/slide9.xml><?xml version="1.0" encoding="utf-8"?>
+<file path=ppt/slides/slide12.xml><?xml version="1.0" encoding="utf-8"?>
+<p:sld xmlns:a="http://schemas.openxmlformats.org/drawingml/2006/main" xmlns:r="http://schemas.openxmlformats.org/officeDocument/2006/relationships" xmlns:p="http://schemas.openxmlformats.org/presentationml/2006/main">
+  <p:cSld>
+    <p:spTree>
+      <p:nvGrpSpPr>
+        <p:cNvPr id="1" name=""/>
+        <p:cNvGrpSpPr/>
+        <p:nvPr/>
+      </p:nvGrpSpPr>
+      <p:grpSpPr>
+        <a:xfrm>
+          <a:off x="0" y="0"/>
+          <a:ext cx="0" cy="0"/>
+          <a:chOff x="0" y="0"/>
+          <a:chExt cx="0" cy="0"/>
+        </a:xfrm>
+      </p:grpSpPr>
+      <p:sp>
+        <p:nvSpPr>
+          <p:cNvPr id="2" name="Title 1">
+            <a:extLst>
+              <a:ext uri="{FF2B5EF4-FFF2-40B4-BE49-F238E27FC236}">
+                <a16:creationId xmlns:a16="http://schemas.microsoft.com/office/drawing/2014/main" id="{98F263C8-E2FF-1C43-B6B6-3D12456E0495}"/>
+              </a:ext>
+            </a:extLst>
+          </p:cNvPr>
+          <p:cNvSpPr>
+            <a:spLocks noGrp="1"/>
+          </p:cNvSpPr>
+          <p:nvPr>
+            <p:ph type="title"/>
+          </p:nvPr>
+        </p:nvSpPr>
+        <p:spPr>
+          <a:xfrm>
+            <a:off x="838200" y="2766218"/>
+            <a:ext cx="10515600" cy="1325563"/>
+          </a:xfrm>
+        </p:spPr>
+        <p:txBody>
+          <a:bodyPr/>
+          <a:lstStyle/>
+          <a:p>
+            <a:pPr algn="ctr"/>
+            <a:r>
+              <a:rPr lang="en-US" dirty="0"/>
+              <a:t>Appendix</a:t>
+            </a:r>
+          </a:p>
+        </p:txBody>
+      </p:sp>
+    </p:spTree>
+    <p:extLst>
+      <p:ext uri="{BB962C8B-B14F-4D97-AF65-F5344CB8AC3E}">
+        <p14:creationId xmlns:p14="http://schemas.microsoft.com/office/powerpoint/2010/main" val="2396937465"/>
+      </p:ext>
+    </p:extLst>
+  </p:cSld>
+  <p:clrMapOvr>
+    <a:masterClrMapping/>
+  </p:clrMapOvr>
+</p:sld>
+</file>
+
+<file path=ppt/slides/slide13.xml><?xml version="1.0" encoding="utf-8"?>
+<p:sld xmlns:a="http://schemas.openxmlformats.org/drawingml/2006/main" xmlns:r="http://schemas.openxmlformats.org/officeDocument/2006/relationships" xmlns:p="http://schemas.openxmlformats.org/presentationml/2006/main">
+  <p:cSld>
+    <p:spTree>
+      <p:nvGrpSpPr>
+        <p:cNvPr id="1" name=""/>
+        <p:cNvGrpSpPr/>
+        <p:nvPr/>
+      </p:nvGrpSpPr>
+      <p:grpSpPr>
+        <a:xfrm>
+          <a:off x="0" y="0"/>
+          <a:ext cx="0" cy="0"/>
+          <a:chOff x="0" y="0"/>
+          <a:chExt cx="0" cy="0"/>
+        </a:xfrm>
+      </p:grpSpPr>
+    </p:spTree>
+    <p:extLst>
+      <p:ext uri="{BB962C8B-B14F-4D97-AF65-F5344CB8AC3E}">
+        <p14:creationId xmlns:p14="http://schemas.microsoft.com/office/powerpoint/2010/main" val="3627269613"/>
+      </p:ext>
+    </p:extLst>
+  </p:cSld>
+  <p:clrMapOvr>
+    <a:masterClrMapping/>
+  </p:clrMapOvr>
+</p:sld>
+</file>
+
+<file path=ppt/slides/slide14.xml><?xml version="1.0" encoding="utf-8"?>
+<p:sld xmlns:a="http://schemas.openxmlformats.org/drawingml/2006/main" xmlns:r="http://schemas.openxmlformats.org/officeDocument/2006/relationships" xmlns:p="http://schemas.openxmlformats.org/presentationml/2006/main">
+  <p:cSld>
+    <p:spTree>
+      <p:nvGrpSpPr>
+        <p:cNvPr id="1" name=""/>
+        <p:cNvGrpSpPr/>
+        <p:nvPr/>
+      </p:nvGrpSpPr>
+      <p:grpSpPr>
+        <a:xfrm>
+          <a:off x="0" y="0"/>
+          <a:ext cx="0" cy="0"/>
+          <a:chOff x="0" y="0"/>
+          <a:chExt cx="0" cy="0"/>
+        </a:xfrm>
+      </p:grpSpPr>
+    </p:spTree>
+    <p:extLst>
+      <p:ext uri="{BB962C8B-B14F-4D97-AF65-F5344CB8AC3E}">
+        <p14:creationId xmlns:p14="http://schemas.microsoft.com/office/powerpoint/2010/main" val="3889761113"/>
+      </p:ext>
+    </p:extLst>
+  </p:cSld>
+  <p:clrMapOvr>
+    <a:masterClrMapping/>
+  </p:clrMapOvr>
+</p:sld>
+</file>
+
+<file path=ppt/slides/slide15.xml><?xml version="1.0" encoding="utf-8"?>
 <p:sld xmlns:a="http://schemas.openxmlformats.org/drawingml/2006/main" xmlns:r="http://schemas.openxmlformats.org/officeDocument/2006/relationships" xmlns:p="http://schemas.openxmlformats.org/presentationml/2006/main">
   <p:cSld>
     <p:spTree>
@@ -10607,6 +9987,930 @@
 </p:sld>
 </file>
 
+<file path=ppt/slides/slide2.xml><?xml version="1.0" encoding="utf-8"?>
+<p:sld xmlns:a="http://schemas.openxmlformats.org/drawingml/2006/main" xmlns:r="http://schemas.openxmlformats.org/officeDocument/2006/relationships" xmlns:p="http://schemas.openxmlformats.org/presentationml/2006/main">
+  <p:cSld>
+    <p:spTree>
+      <p:nvGrpSpPr>
+        <p:cNvPr id="1" name=""/>
+        <p:cNvGrpSpPr/>
+        <p:nvPr/>
+      </p:nvGrpSpPr>
+      <p:grpSpPr>
+        <a:xfrm>
+          <a:off x="0" y="0"/>
+          <a:ext cx="0" cy="0"/>
+          <a:chOff x="0" y="0"/>
+          <a:chExt cx="0" cy="0"/>
+        </a:xfrm>
+      </p:grpSpPr>
+      <p:sp>
+        <p:nvSpPr>
+          <p:cNvPr id="2" name="Title 1">
+            <a:extLst>
+              <a:ext uri="{FF2B5EF4-FFF2-40B4-BE49-F238E27FC236}">
+                <a16:creationId xmlns:a16="http://schemas.microsoft.com/office/drawing/2014/main" id="{98F263C8-E2FF-1C43-B6B6-3D12456E0495}"/>
+              </a:ext>
+            </a:extLst>
+          </p:cNvPr>
+          <p:cNvSpPr>
+            <a:spLocks noGrp="1"/>
+          </p:cNvSpPr>
+          <p:nvPr>
+            <p:ph type="title"/>
+          </p:nvPr>
+        </p:nvSpPr>
+        <p:spPr/>
+        <p:txBody>
+          <a:bodyPr/>
+          <a:lstStyle/>
+          <a:p>
+            <a:r>
+              <a:rPr lang="en-US" dirty="0"/>
+              <a:t>Extract Process</a:t>
+            </a:r>
+          </a:p>
+        </p:txBody>
+      </p:sp>
+      <p:sp>
+        <p:nvSpPr>
+          <p:cNvPr id="3" name="Content Placeholder 2">
+            <a:extLst>
+              <a:ext uri="{FF2B5EF4-FFF2-40B4-BE49-F238E27FC236}">
+                <a16:creationId xmlns:a16="http://schemas.microsoft.com/office/drawing/2014/main" id="{F692B38E-C3FA-D444-A1AA-A5A3B9461394}"/>
+              </a:ext>
+            </a:extLst>
+          </p:cNvPr>
+          <p:cNvSpPr>
+            <a:spLocks noGrp="1"/>
+          </p:cNvSpPr>
+          <p:nvPr>
+            <p:ph idx="1"/>
+          </p:nvPr>
+        </p:nvSpPr>
+        <p:spPr/>
+        <p:txBody>
+          <a:bodyPr>
+            <a:normAutofit/>
+          </a:bodyPr>
+          <a:lstStyle/>
+          <a:p>
+            <a:pPr marL="0" indent="0">
+              <a:buNone/>
+            </a:pPr>
+            <a:r>
+              <a:rPr lang="en-US" dirty="0"/>
+              <a:t>Read data</a:t>
+            </a:r>
+          </a:p>
+          <a:p>
+            <a:r>
+              <a:rPr lang="en-US" sz="2200" dirty="0"/>
+              <a:t>We used several data sources to processes to cleanse and prep files in the following formats:</a:t>
+            </a:r>
+          </a:p>
+          <a:p>
+            <a:r>
+              <a:rPr lang="en-US" sz="2200" dirty="0"/>
+              <a:t>CSV files / JSON files / Spreadsheets </a:t>
+            </a:r>
+          </a:p>
+          <a:p>
+            <a:endParaRPr lang="en-US" sz="2200" dirty="0"/>
+          </a:p>
+          <a:p>
+            <a:pPr marL="0" indent="0">
+              <a:buNone/>
+            </a:pPr>
+            <a:r>
+              <a:rPr lang="en-US" sz="2200" dirty="0"/>
+              <a:t>Data Sources </a:t>
+            </a:r>
+          </a:p>
+          <a:p>
+            <a:r>
+              <a:rPr lang="en-US" sz="2200" dirty="0">
+                <a:hlinkClick r:id="rId2"/>
+              </a:rPr>
+              <a:t>www.geonames.org</a:t>
+            </a:r>
+            <a:r>
+              <a:rPr lang="en-US" sz="2200" dirty="0"/>
+              <a:t> (.txt converted to csv) and (JSON to csv)</a:t>
+            </a:r>
+          </a:p>
+          <a:p>
+            <a:r>
+              <a:rPr lang="en-US" sz="2200" dirty="0">
+                <a:hlinkClick r:id="rId3"/>
+              </a:rPr>
+              <a:t>www.cdc.gov.gov/zika/reporting/index.html</a:t>
+            </a:r>
+            <a:r>
+              <a:rPr lang="en-US" sz="2200" dirty="0"/>
+              <a:t> (.</a:t>
+            </a:r>
+            <a:r>
+              <a:rPr lang="en-US" sz="2200" dirty="0" err="1"/>
+              <a:t>xls</a:t>
+            </a:r>
+            <a:r>
+              <a:rPr lang="en-US" sz="2200" dirty="0"/>
+              <a:t> converted to csv)</a:t>
+            </a:r>
+          </a:p>
+          <a:p>
+            <a:r>
+              <a:rPr lang="en-US" sz="2200" dirty="0">
+                <a:hlinkClick r:id="rId4"/>
+              </a:rPr>
+              <a:t>www.census.gov/topics/health/birth-defects </a:t>
+            </a:r>
+            <a:r>
+              <a:rPr lang="en-US" sz="2200" dirty="0"/>
+              <a:t> (csv file)</a:t>
+            </a:r>
+          </a:p>
+          <a:p>
+            <a:endParaRPr lang="en-US" sz="2200" dirty="0"/>
+          </a:p>
+          <a:p>
+            <a:endParaRPr lang="en-US" sz="2200" dirty="0"/>
+          </a:p>
+          <a:p>
+            <a:pPr marL="0" indent="0">
+              <a:buNone/>
+            </a:pPr>
+            <a:endParaRPr lang="en-US" sz="2200" dirty="0"/>
+          </a:p>
+          <a:p>
+            <a:endParaRPr lang="en-US" sz="2200" dirty="0"/>
+          </a:p>
+          <a:p>
+            <a:endParaRPr lang="en-US" dirty="0"/>
+          </a:p>
+        </p:txBody>
+      </p:sp>
+    </p:spTree>
+    <p:extLst>
+      <p:ext uri="{BB962C8B-B14F-4D97-AF65-F5344CB8AC3E}">
+        <p14:creationId xmlns:p14="http://schemas.microsoft.com/office/powerpoint/2010/main" val="4198240260"/>
+      </p:ext>
+    </p:extLst>
+  </p:cSld>
+  <p:clrMapOvr>
+    <a:masterClrMapping/>
+  </p:clrMapOvr>
+</p:sld>
+</file>
+
+<file path=ppt/slides/slide3.xml><?xml version="1.0" encoding="utf-8"?>
+<p:sld xmlns:a="http://schemas.openxmlformats.org/drawingml/2006/main" xmlns:r="http://schemas.openxmlformats.org/officeDocument/2006/relationships" xmlns:p="http://schemas.openxmlformats.org/presentationml/2006/main">
+  <p:cSld>
+    <p:spTree>
+      <p:nvGrpSpPr>
+        <p:cNvPr id="1" name=""/>
+        <p:cNvGrpSpPr/>
+        <p:nvPr/>
+      </p:nvGrpSpPr>
+      <p:grpSpPr>
+        <a:xfrm>
+          <a:off x="0" y="0"/>
+          <a:ext cx="0" cy="0"/>
+          <a:chOff x="0" y="0"/>
+          <a:chExt cx="0" cy="0"/>
+        </a:xfrm>
+      </p:grpSpPr>
+      <p:sp>
+        <p:nvSpPr>
+          <p:cNvPr id="2" name="Title 1">
+            <a:extLst>
+              <a:ext uri="{FF2B5EF4-FFF2-40B4-BE49-F238E27FC236}">
+                <a16:creationId xmlns:a16="http://schemas.microsoft.com/office/drawing/2014/main" id="{98F263C8-E2FF-1C43-B6B6-3D12456E0495}"/>
+              </a:ext>
+            </a:extLst>
+          </p:cNvPr>
+          <p:cNvSpPr>
+            <a:spLocks noGrp="1"/>
+          </p:cNvSpPr>
+          <p:nvPr>
+            <p:ph type="title"/>
+          </p:nvPr>
+        </p:nvSpPr>
+        <p:spPr/>
+        <p:txBody>
+          <a:bodyPr/>
+          <a:lstStyle/>
+          <a:p>
+            <a:r>
+              <a:rPr lang="en-US" dirty="0"/>
+              <a:t>Transformation Process</a:t>
+            </a:r>
+          </a:p>
+        </p:txBody>
+      </p:sp>
+      <p:sp>
+        <p:nvSpPr>
+          <p:cNvPr id="3" name="Content Placeholder 2">
+            <a:extLst>
+              <a:ext uri="{FF2B5EF4-FFF2-40B4-BE49-F238E27FC236}">
+                <a16:creationId xmlns:a16="http://schemas.microsoft.com/office/drawing/2014/main" id="{F692B38E-C3FA-D444-A1AA-A5A3B9461394}"/>
+              </a:ext>
+            </a:extLst>
+          </p:cNvPr>
+          <p:cNvSpPr>
+            <a:spLocks noGrp="1"/>
+          </p:cNvSpPr>
+          <p:nvPr>
+            <p:ph idx="1"/>
+          </p:nvPr>
+        </p:nvSpPr>
+        <p:spPr/>
+        <p:txBody>
+          <a:bodyPr>
+            <a:normAutofit/>
+          </a:bodyPr>
+          <a:lstStyle/>
+          <a:p>
+            <a:r>
+              <a:rPr lang="en-US" dirty="0"/>
+              <a:t>Data cleaning</a:t>
+            </a:r>
+          </a:p>
+          <a:p>
+            <a:pPr lvl="1"/>
+            <a:r>
+              <a:rPr lang="en-US" dirty="0"/>
+              <a:t>Manipulated data and used (states as primary id)</a:t>
+            </a:r>
+          </a:p>
+          <a:p>
+            <a:endParaRPr lang="en-US" dirty="0"/>
+          </a:p>
+          <a:p>
+            <a:r>
+              <a:rPr lang="en-US" dirty="0"/>
+              <a:t>Joining</a:t>
+            </a:r>
+          </a:p>
+          <a:p>
+            <a:pPr lvl="1"/>
+            <a:r>
+              <a:rPr lang="en-US" dirty="0"/>
+              <a:t>Joined multiple data sources into one repository</a:t>
+            </a:r>
+          </a:p>
+          <a:p>
+            <a:endParaRPr lang="en-US" dirty="0"/>
+          </a:p>
+          <a:p>
+            <a:endParaRPr lang="en-US" dirty="0"/>
+          </a:p>
+          <a:p>
+            <a:endParaRPr lang="en-US" dirty="0"/>
+          </a:p>
+        </p:txBody>
+      </p:sp>
+    </p:spTree>
+    <p:extLst>
+      <p:ext uri="{BB962C8B-B14F-4D97-AF65-F5344CB8AC3E}">
+        <p14:creationId xmlns:p14="http://schemas.microsoft.com/office/powerpoint/2010/main" val="2908985784"/>
+      </p:ext>
+    </p:extLst>
+  </p:cSld>
+  <p:clrMapOvr>
+    <a:masterClrMapping/>
+  </p:clrMapOvr>
+</p:sld>
+</file>
+
+<file path=ppt/slides/slide4.xml><?xml version="1.0" encoding="utf-8"?>
+<p:sld xmlns:a="http://schemas.openxmlformats.org/drawingml/2006/main" xmlns:r="http://schemas.openxmlformats.org/officeDocument/2006/relationships" xmlns:p="http://schemas.openxmlformats.org/presentationml/2006/main">
+  <p:cSld>
+    <p:spTree>
+      <p:nvGrpSpPr>
+        <p:cNvPr id="1" name=""/>
+        <p:cNvGrpSpPr/>
+        <p:nvPr/>
+      </p:nvGrpSpPr>
+      <p:grpSpPr>
+        <a:xfrm>
+          <a:off x="0" y="0"/>
+          <a:ext cx="0" cy="0"/>
+          <a:chOff x="0" y="0"/>
+          <a:chExt cx="0" cy="0"/>
+        </a:xfrm>
+      </p:grpSpPr>
+      <p:sp>
+        <p:nvSpPr>
+          <p:cNvPr id="2" name="Title 1">
+            <a:extLst>
+              <a:ext uri="{FF2B5EF4-FFF2-40B4-BE49-F238E27FC236}">
+                <a16:creationId xmlns:a16="http://schemas.microsoft.com/office/drawing/2014/main" id="{98F263C8-E2FF-1C43-B6B6-3D12456E0495}"/>
+              </a:ext>
+            </a:extLst>
+          </p:cNvPr>
+          <p:cNvSpPr>
+            <a:spLocks noGrp="1"/>
+          </p:cNvSpPr>
+          <p:nvPr>
+            <p:ph type="title"/>
+          </p:nvPr>
+        </p:nvSpPr>
+        <p:spPr/>
+        <p:txBody>
+          <a:bodyPr/>
+          <a:lstStyle/>
+          <a:p>
+            <a:r>
+              <a:rPr lang="en-US" dirty="0"/>
+              <a:t>Transformation Process Continued</a:t>
+            </a:r>
+          </a:p>
+        </p:txBody>
+      </p:sp>
+      <p:sp>
+        <p:nvSpPr>
+          <p:cNvPr id="3" name="Content Placeholder 2">
+            <a:extLst>
+              <a:ext uri="{FF2B5EF4-FFF2-40B4-BE49-F238E27FC236}">
+                <a16:creationId xmlns:a16="http://schemas.microsoft.com/office/drawing/2014/main" id="{F692B38E-C3FA-D444-A1AA-A5A3B9461394}"/>
+              </a:ext>
+            </a:extLst>
+          </p:cNvPr>
+          <p:cNvSpPr>
+            <a:spLocks noGrp="1"/>
+          </p:cNvSpPr>
+          <p:nvPr>
+            <p:ph idx="1"/>
+          </p:nvPr>
+        </p:nvSpPr>
+        <p:spPr/>
+        <p:txBody>
+          <a:bodyPr>
+            <a:normAutofit/>
+          </a:bodyPr>
+          <a:lstStyle/>
+          <a:p>
+            <a:r>
+              <a:rPr lang="en-US" dirty="0"/>
+              <a:t>Filtering</a:t>
+            </a:r>
+          </a:p>
+          <a:p>
+            <a:pPr lvl="1"/>
+            <a:r>
+              <a:rPr lang="en-US" dirty="0"/>
+              <a:t>The filtering process consisted of</a:t>
+            </a:r>
+          </a:p>
+          <a:p>
+            <a:pPr lvl="1"/>
+            <a:endParaRPr lang="en-US" dirty="0"/>
+          </a:p>
+          <a:p>
+            <a:pPr marL="0" indent="0">
+              <a:buNone/>
+            </a:pPr>
+            <a:endParaRPr lang="en-US" dirty="0"/>
+          </a:p>
+          <a:p>
+            <a:r>
+              <a:rPr lang="en-US" dirty="0"/>
+              <a:t>Aggregating</a:t>
+            </a:r>
+          </a:p>
+          <a:p>
+            <a:pPr lvl="1"/>
+            <a:r>
+              <a:rPr lang="en-US" dirty="0"/>
+              <a:t>The aggregating process consisted of</a:t>
+            </a:r>
+          </a:p>
+          <a:p>
+            <a:endParaRPr lang="en-US" dirty="0"/>
+          </a:p>
+          <a:p>
+            <a:endParaRPr lang="en-US" dirty="0"/>
+          </a:p>
+          <a:p>
+            <a:endParaRPr lang="en-US" dirty="0"/>
+          </a:p>
+        </p:txBody>
+      </p:sp>
+    </p:spTree>
+    <p:extLst>
+      <p:ext uri="{BB962C8B-B14F-4D97-AF65-F5344CB8AC3E}">
+        <p14:creationId xmlns:p14="http://schemas.microsoft.com/office/powerpoint/2010/main" val="761823061"/>
+      </p:ext>
+    </p:extLst>
+  </p:cSld>
+  <p:clrMapOvr>
+    <a:masterClrMapping/>
+  </p:clrMapOvr>
+</p:sld>
+</file>
+
+<file path=ppt/slides/slide5.xml><?xml version="1.0" encoding="utf-8"?>
+<p:sld xmlns:a="http://schemas.openxmlformats.org/drawingml/2006/main" xmlns:r="http://schemas.openxmlformats.org/officeDocument/2006/relationships" xmlns:p="http://schemas.openxmlformats.org/presentationml/2006/main">
+  <p:cSld>
+    <p:spTree>
+      <p:nvGrpSpPr>
+        <p:cNvPr id="1" name=""/>
+        <p:cNvGrpSpPr/>
+        <p:nvPr/>
+      </p:nvGrpSpPr>
+      <p:grpSpPr>
+        <a:xfrm>
+          <a:off x="0" y="0"/>
+          <a:ext cx="0" cy="0"/>
+          <a:chOff x="0" y="0"/>
+          <a:chExt cx="0" cy="0"/>
+        </a:xfrm>
+      </p:grpSpPr>
+      <p:sp>
+        <p:nvSpPr>
+          <p:cNvPr id="2" name="Title 1">
+            <a:extLst>
+              <a:ext uri="{FF2B5EF4-FFF2-40B4-BE49-F238E27FC236}">
+                <a16:creationId xmlns:a16="http://schemas.microsoft.com/office/drawing/2014/main" id="{98F263C8-E2FF-1C43-B6B6-3D12456E0495}"/>
+              </a:ext>
+            </a:extLst>
+          </p:cNvPr>
+          <p:cNvSpPr>
+            <a:spLocks noGrp="1"/>
+          </p:cNvSpPr>
+          <p:nvPr>
+            <p:ph type="title"/>
+          </p:nvPr>
+        </p:nvSpPr>
+        <p:spPr/>
+        <p:txBody>
+          <a:bodyPr/>
+          <a:lstStyle/>
+          <a:p>
+            <a:r>
+              <a:rPr lang="en-US" dirty="0"/>
+              <a:t>Transformation Process Continued</a:t>
+            </a:r>
+          </a:p>
+        </p:txBody>
+      </p:sp>
+      <p:sp>
+        <p:nvSpPr>
+          <p:cNvPr id="3" name="Content Placeholder 2">
+            <a:extLst>
+              <a:ext uri="{FF2B5EF4-FFF2-40B4-BE49-F238E27FC236}">
+                <a16:creationId xmlns:a16="http://schemas.microsoft.com/office/drawing/2014/main" id="{F692B38E-C3FA-D444-A1AA-A5A3B9461394}"/>
+              </a:ext>
+            </a:extLst>
+          </p:cNvPr>
+          <p:cNvSpPr>
+            <a:spLocks noGrp="1"/>
+          </p:cNvSpPr>
+          <p:nvPr>
+            <p:ph idx="1"/>
+          </p:nvPr>
+        </p:nvSpPr>
+        <p:spPr/>
+        <p:txBody>
+          <a:bodyPr>
+            <a:normAutofit/>
+          </a:bodyPr>
+          <a:lstStyle/>
+          <a:p>
+            <a:r>
+              <a:rPr lang="en-US" dirty="0"/>
+              <a:t>Selection</a:t>
+            </a:r>
+          </a:p>
+          <a:p>
+            <a:pPr lvl="1"/>
+            <a:r>
+              <a:rPr lang="en-US" dirty="0"/>
+              <a:t>The selection process consisted of</a:t>
+            </a:r>
+          </a:p>
+          <a:p>
+            <a:endParaRPr lang="en-US" dirty="0"/>
+          </a:p>
+          <a:p>
+            <a:endParaRPr lang="en-US" dirty="0"/>
+          </a:p>
+          <a:p>
+            <a:r>
+              <a:rPr lang="en-US" dirty="0"/>
+              <a:t>Summarization</a:t>
+            </a:r>
+          </a:p>
+          <a:p>
+            <a:pPr lvl="1"/>
+            <a:r>
+              <a:rPr lang="en-US" dirty="0"/>
+              <a:t>The summarization process consisted of</a:t>
+            </a:r>
+          </a:p>
+          <a:p>
+            <a:endParaRPr lang="en-US" dirty="0"/>
+          </a:p>
+          <a:p>
+            <a:endParaRPr lang="en-US" dirty="0"/>
+          </a:p>
+          <a:p>
+            <a:endParaRPr lang="en-US" dirty="0"/>
+          </a:p>
+        </p:txBody>
+      </p:sp>
+    </p:spTree>
+    <p:extLst>
+      <p:ext uri="{BB962C8B-B14F-4D97-AF65-F5344CB8AC3E}">
+        <p14:creationId xmlns:p14="http://schemas.microsoft.com/office/powerpoint/2010/main" val="1595102223"/>
+      </p:ext>
+    </p:extLst>
+  </p:cSld>
+  <p:clrMapOvr>
+    <a:masterClrMapping/>
+  </p:clrMapOvr>
+</p:sld>
+</file>
+
+<file path=ppt/slides/slide6.xml><?xml version="1.0" encoding="utf-8"?>
+<p:sld xmlns:a="http://schemas.openxmlformats.org/drawingml/2006/main" xmlns:r="http://schemas.openxmlformats.org/officeDocument/2006/relationships" xmlns:p="http://schemas.openxmlformats.org/presentationml/2006/main">
+  <p:cSld>
+    <p:spTree>
+      <p:nvGrpSpPr>
+        <p:cNvPr id="1" name=""/>
+        <p:cNvGrpSpPr/>
+        <p:nvPr/>
+      </p:nvGrpSpPr>
+      <p:grpSpPr>
+        <a:xfrm>
+          <a:off x="0" y="0"/>
+          <a:ext cx="0" cy="0"/>
+          <a:chOff x="0" y="0"/>
+          <a:chExt cx="0" cy="0"/>
+        </a:xfrm>
+      </p:grpSpPr>
+      <p:pic>
+        <p:nvPicPr>
+          <p:cNvPr id="3" name="Picture 2">
+            <a:extLst>
+              <a:ext uri="{FF2B5EF4-FFF2-40B4-BE49-F238E27FC236}">
+                <a16:creationId xmlns:a16="http://schemas.microsoft.com/office/drawing/2014/main" id="{4E16D86C-692A-1A4A-A5B6-FEEF529CD523}"/>
+              </a:ext>
+            </a:extLst>
+          </p:cNvPr>
+          <p:cNvPicPr>
+            <a:picLocks noChangeAspect="1"/>
+          </p:cNvPicPr>
+          <p:nvPr/>
+        </p:nvPicPr>
+        <p:blipFill>
+          <a:blip r:embed="rId2"/>
+          <a:stretch>
+            <a:fillRect/>
+          </a:stretch>
+        </p:blipFill>
+        <p:spPr>
+          <a:xfrm>
+            <a:off x="516467" y="429684"/>
+            <a:ext cx="10718800" cy="3187700"/>
+          </a:xfrm>
+          <a:prstGeom prst="rect">
+            <a:avLst/>
+          </a:prstGeom>
+        </p:spPr>
+      </p:pic>
+      <p:pic>
+        <p:nvPicPr>
+          <p:cNvPr id="4" name="Picture 3">
+            <a:extLst>
+              <a:ext uri="{FF2B5EF4-FFF2-40B4-BE49-F238E27FC236}">
+                <a16:creationId xmlns:a16="http://schemas.microsoft.com/office/drawing/2014/main" id="{33AFB218-BA18-124E-8871-7BBB70B04733}"/>
+              </a:ext>
+            </a:extLst>
+          </p:cNvPr>
+          <p:cNvPicPr>
+            <a:picLocks noChangeAspect="1"/>
+          </p:cNvPicPr>
+          <p:nvPr/>
+        </p:nvPicPr>
+        <p:blipFill>
+          <a:blip r:embed="rId3"/>
+          <a:stretch>
+            <a:fillRect/>
+          </a:stretch>
+        </p:blipFill>
+        <p:spPr>
+          <a:xfrm>
+            <a:off x="516467" y="3754967"/>
+            <a:ext cx="8102600" cy="2870200"/>
+          </a:xfrm>
+          <a:prstGeom prst="rect">
+            <a:avLst/>
+          </a:prstGeom>
+        </p:spPr>
+      </p:pic>
+    </p:spTree>
+    <p:extLst>
+      <p:ext uri="{BB962C8B-B14F-4D97-AF65-F5344CB8AC3E}">
+        <p14:creationId xmlns:p14="http://schemas.microsoft.com/office/powerpoint/2010/main" val="3860885931"/>
+      </p:ext>
+    </p:extLst>
+  </p:cSld>
+  <p:clrMapOvr>
+    <a:masterClrMapping/>
+  </p:clrMapOvr>
+</p:sld>
+</file>
+
+<file path=ppt/slides/slide7.xml><?xml version="1.0" encoding="utf-8"?>
+<p:sld xmlns:a="http://schemas.openxmlformats.org/drawingml/2006/main" xmlns:r="http://schemas.openxmlformats.org/officeDocument/2006/relationships" xmlns:p="http://schemas.openxmlformats.org/presentationml/2006/main">
+  <p:cSld>
+    <p:spTree>
+      <p:nvGrpSpPr>
+        <p:cNvPr id="1" name=""/>
+        <p:cNvGrpSpPr/>
+        <p:nvPr/>
+      </p:nvGrpSpPr>
+      <p:grpSpPr>
+        <a:xfrm>
+          <a:off x="0" y="0"/>
+          <a:ext cx="0" cy="0"/>
+          <a:chOff x="0" y="0"/>
+          <a:chExt cx="0" cy="0"/>
+        </a:xfrm>
+      </p:grpSpPr>
+      <p:pic>
+        <p:nvPicPr>
+          <p:cNvPr id="2" name="Picture 1">
+            <a:extLst>
+              <a:ext uri="{FF2B5EF4-FFF2-40B4-BE49-F238E27FC236}">
+                <a16:creationId xmlns:a16="http://schemas.microsoft.com/office/drawing/2014/main" id="{69D26A84-83D0-C249-92EE-9E77CBCA00B7}"/>
+              </a:ext>
+            </a:extLst>
+          </p:cNvPr>
+          <p:cNvPicPr>
+            <a:picLocks noChangeAspect="1"/>
+          </p:cNvPicPr>
+          <p:nvPr/>
+        </p:nvPicPr>
+        <p:blipFill>
+          <a:blip r:embed="rId2"/>
+          <a:stretch>
+            <a:fillRect/>
+          </a:stretch>
+        </p:blipFill>
+        <p:spPr>
+          <a:xfrm>
+            <a:off x="512233" y="491067"/>
+            <a:ext cx="7158567" cy="2571710"/>
+          </a:xfrm>
+          <a:prstGeom prst="rect">
+            <a:avLst/>
+          </a:prstGeom>
+        </p:spPr>
+      </p:pic>
+      <p:pic>
+        <p:nvPicPr>
+          <p:cNvPr id="3" name="Picture 2">
+            <a:extLst>
+              <a:ext uri="{FF2B5EF4-FFF2-40B4-BE49-F238E27FC236}">
+                <a16:creationId xmlns:a16="http://schemas.microsoft.com/office/drawing/2014/main" id="{ADB53632-FF01-1C4B-B3F4-A8F3C629397A}"/>
+              </a:ext>
+            </a:extLst>
+          </p:cNvPr>
+          <p:cNvPicPr>
+            <a:picLocks noChangeAspect="1"/>
+          </p:cNvPicPr>
+          <p:nvPr/>
+        </p:nvPicPr>
+        <p:blipFill>
+          <a:blip r:embed="rId3"/>
+          <a:stretch>
+            <a:fillRect/>
+          </a:stretch>
+        </p:blipFill>
+        <p:spPr>
+          <a:xfrm>
+            <a:off x="512233" y="3062777"/>
+            <a:ext cx="8944591" cy="3492540"/>
+          </a:xfrm>
+          <a:prstGeom prst="rect">
+            <a:avLst/>
+          </a:prstGeom>
+        </p:spPr>
+      </p:pic>
+    </p:spTree>
+    <p:extLst>
+      <p:ext uri="{BB962C8B-B14F-4D97-AF65-F5344CB8AC3E}">
+        <p14:creationId xmlns:p14="http://schemas.microsoft.com/office/powerpoint/2010/main" val="1285546414"/>
+      </p:ext>
+    </p:extLst>
+  </p:cSld>
+  <p:clrMapOvr>
+    <a:masterClrMapping/>
+  </p:clrMapOvr>
+</p:sld>
+</file>
+
+<file path=ppt/slides/slide8.xml><?xml version="1.0" encoding="utf-8"?>
+<p:sld xmlns:a="http://schemas.openxmlformats.org/drawingml/2006/main" xmlns:r="http://schemas.openxmlformats.org/officeDocument/2006/relationships" xmlns:p="http://schemas.openxmlformats.org/presentationml/2006/main">
+  <p:cSld>
+    <p:spTree>
+      <p:nvGrpSpPr>
+        <p:cNvPr id="1" name=""/>
+        <p:cNvGrpSpPr/>
+        <p:nvPr/>
+      </p:nvGrpSpPr>
+      <p:grpSpPr>
+        <a:xfrm>
+          <a:off x="0" y="0"/>
+          <a:ext cx="0" cy="0"/>
+          <a:chOff x="0" y="0"/>
+          <a:chExt cx="0" cy="0"/>
+        </a:xfrm>
+      </p:grpSpPr>
+      <p:pic>
+        <p:nvPicPr>
+          <p:cNvPr id="2" name="Picture 1">
+            <a:extLst>
+              <a:ext uri="{FF2B5EF4-FFF2-40B4-BE49-F238E27FC236}">
+                <a16:creationId xmlns:a16="http://schemas.microsoft.com/office/drawing/2014/main" id="{C43572C3-16BA-4A49-BF0A-B3FBC9EAE884}"/>
+              </a:ext>
+            </a:extLst>
+          </p:cNvPr>
+          <p:cNvPicPr>
+            <a:picLocks noChangeAspect="1"/>
+          </p:cNvPicPr>
+          <p:nvPr/>
+        </p:nvPicPr>
+        <p:blipFill>
+          <a:blip r:embed="rId2"/>
+          <a:stretch>
+            <a:fillRect/>
+          </a:stretch>
+        </p:blipFill>
+        <p:spPr>
+          <a:xfrm>
+            <a:off x="381000" y="323850"/>
+            <a:ext cx="3911600" cy="2857500"/>
+          </a:xfrm>
+          <a:prstGeom prst="rect">
+            <a:avLst/>
+          </a:prstGeom>
+        </p:spPr>
+      </p:pic>
+      <p:pic>
+        <p:nvPicPr>
+          <p:cNvPr id="3" name="Picture 2">
+            <a:extLst>
+              <a:ext uri="{FF2B5EF4-FFF2-40B4-BE49-F238E27FC236}">
+                <a16:creationId xmlns:a16="http://schemas.microsoft.com/office/drawing/2014/main" id="{C58920B8-31FF-9144-81EE-92EAD8F65B8B}"/>
+              </a:ext>
+            </a:extLst>
+          </p:cNvPr>
+          <p:cNvPicPr>
+            <a:picLocks noChangeAspect="1"/>
+          </p:cNvPicPr>
+          <p:nvPr/>
+        </p:nvPicPr>
+        <p:blipFill>
+          <a:blip r:embed="rId3"/>
+          <a:stretch>
+            <a:fillRect/>
+          </a:stretch>
+        </p:blipFill>
+        <p:spPr>
+          <a:xfrm>
+            <a:off x="381000" y="3181350"/>
+            <a:ext cx="6883400" cy="3378200"/>
+          </a:xfrm>
+          <a:prstGeom prst="rect">
+            <a:avLst/>
+          </a:prstGeom>
+        </p:spPr>
+      </p:pic>
+    </p:spTree>
+    <p:extLst>
+      <p:ext uri="{BB962C8B-B14F-4D97-AF65-F5344CB8AC3E}">
+        <p14:creationId xmlns:p14="http://schemas.microsoft.com/office/powerpoint/2010/main" val="2327277018"/>
+      </p:ext>
+    </p:extLst>
+  </p:cSld>
+  <p:clrMapOvr>
+    <a:masterClrMapping/>
+  </p:clrMapOvr>
+</p:sld>
+</file>
+
+<file path=ppt/slides/slide9.xml><?xml version="1.0" encoding="utf-8"?>
+<p:sld xmlns:a="http://schemas.openxmlformats.org/drawingml/2006/main" xmlns:r="http://schemas.openxmlformats.org/officeDocument/2006/relationships" xmlns:p="http://schemas.openxmlformats.org/presentationml/2006/main">
+  <p:cSld>
+    <p:spTree>
+      <p:nvGrpSpPr>
+        <p:cNvPr id="1" name=""/>
+        <p:cNvGrpSpPr/>
+        <p:nvPr/>
+      </p:nvGrpSpPr>
+      <p:grpSpPr>
+        <a:xfrm>
+          <a:off x="0" y="0"/>
+          <a:ext cx="0" cy="0"/>
+          <a:chOff x="0" y="0"/>
+          <a:chExt cx="0" cy="0"/>
+        </a:xfrm>
+      </p:grpSpPr>
+      <p:sp>
+        <p:nvSpPr>
+          <p:cNvPr id="2" name="Title 1">
+            <a:extLst>
+              <a:ext uri="{FF2B5EF4-FFF2-40B4-BE49-F238E27FC236}">
+                <a16:creationId xmlns:a16="http://schemas.microsoft.com/office/drawing/2014/main" id="{98F263C8-E2FF-1C43-B6B6-3D12456E0495}"/>
+              </a:ext>
+            </a:extLst>
+          </p:cNvPr>
+          <p:cNvSpPr>
+            <a:spLocks noGrp="1"/>
+          </p:cNvSpPr>
+          <p:nvPr>
+            <p:ph type="title"/>
+          </p:nvPr>
+        </p:nvSpPr>
+        <p:spPr/>
+        <p:txBody>
+          <a:bodyPr/>
+          <a:lstStyle/>
+          <a:p>
+            <a:r>
+              <a:rPr lang="en-US" dirty="0"/>
+              <a:t>Load Process</a:t>
+            </a:r>
+          </a:p>
+        </p:txBody>
+      </p:sp>
+      <p:sp>
+        <p:nvSpPr>
+          <p:cNvPr id="3" name="Content Placeholder 2">
+            <a:extLst>
+              <a:ext uri="{FF2B5EF4-FFF2-40B4-BE49-F238E27FC236}">
+                <a16:creationId xmlns:a16="http://schemas.microsoft.com/office/drawing/2014/main" id="{F692B38E-C3FA-D444-A1AA-A5A3B9461394}"/>
+              </a:ext>
+            </a:extLst>
+          </p:cNvPr>
+          <p:cNvSpPr>
+            <a:spLocks noGrp="1"/>
+          </p:cNvSpPr>
+          <p:nvPr>
+            <p:ph idx="1"/>
+          </p:nvPr>
+        </p:nvSpPr>
+        <p:spPr/>
+        <p:txBody>
+          <a:bodyPr/>
+          <a:lstStyle/>
+          <a:p>
+            <a:pPr marL="0" indent="0">
+              <a:buNone/>
+            </a:pPr>
+            <a:r>
+              <a:rPr lang="en-US" dirty="0"/>
+              <a:t>Load process</a:t>
+            </a:r>
+          </a:p>
+          <a:p>
+            <a:r>
+              <a:rPr lang="en-US" dirty="0"/>
+              <a:t>The final load process consolidated multiple data sources into one central database</a:t>
+            </a:r>
+          </a:p>
+          <a:p>
+            <a:endParaRPr lang="en-US" dirty="0"/>
+          </a:p>
+          <a:p>
+            <a:r>
+              <a:rPr lang="en-US" dirty="0"/>
+              <a:t>This database will be accessed by power users such as analysts, data scientists and executives to run various reports via multiple data management tools</a:t>
+            </a:r>
+          </a:p>
+          <a:p>
+            <a:endParaRPr lang="en-US" dirty="0"/>
+          </a:p>
+        </p:txBody>
+      </p:sp>
+    </p:spTree>
+    <p:extLst>
+      <p:ext uri="{BB962C8B-B14F-4D97-AF65-F5344CB8AC3E}">
+        <p14:creationId xmlns:p14="http://schemas.microsoft.com/office/powerpoint/2010/main" val="696670445"/>
+      </p:ext>
+    </p:extLst>
+  </p:cSld>
+  <p:clrMapOvr>
+    <a:masterClrMapping/>
+  </p:clrMapOvr>
+</p:sld>
+</file>
+
 <file path=ppt/theme/theme1.xml><?xml version="1.0" encoding="utf-8"?>
 <a:theme xmlns:a="http://schemas.openxmlformats.org/drawingml/2006/main" name="Office Theme">
   <a:themeElements>

</xml_diff>